<commit_message>
removed rooms at Christian's suggestion
removed condos, haig's back yard, one beach shot, added handprints
</commit_message>
<xml_diff>
--- a/map.pptx
+++ b/map.pptx
@@ -288,7 +288,7 @@
           <a:p>
             <a:fld id="{2D05C57E-06E5-413A-9C09-94DC04DBE935}" type="datetimeFigureOut">
               <a:rPr lang="en-US" smtClean="0"/>
-              <a:t>11/22/2012</a:t>
+              <a:t>12/9/2012</a:t>
             </a:fld>
             <a:endParaRPr lang="en-US"/>
           </a:p>
@@ -458,7 +458,7 @@
           <a:p>
             <a:fld id="{2D05C57E-06E5-413A-9C09-94DC04DBE935}" type="datetimeFigureOut">
               <a:rPr lang="en-US" smtClean="0"/>
-              <a:t>11/22/2012</a:t>
+              <a:t>12/9/2012</a:t>
             </a:fld>
             <a:endParaRPr lang="en-US"/>
           </a:p>
@@ -638,7 +638,7 @@
           <a:p>
             <a:fld id="{2D05C57E-06E5-413A-9C09-94DC04DBE935}" type="datetimeFigureOut">
               <a:rPr lang="en-US" smtClean="0"/>
-              <a:t>11/22/2012</a:t>
+              <a:t>12/9/2012</a:t>
             </a:fld>
             <a:endParaRPr lang="en-US"/>
           </a:p>
@@ -808,7 +808,7 @@
           <a:p>
             <a:fld id="{2D05C57E-06E5-413A-9C09-94DC04DBE935}" type="datetimeFigureOut">
               <a:rPr lang="en-US" smtClean="0"/>
-              <a:t>11/22/2012</a:t>
+              <a:t>12/9/2012</a:t>
             </a:fld>
             <a:endParaRPr lang="en-US"/>
           </a:p>
@@ -1054,7 +1054,7 @@
           <a:p>
             <a:fld id="{2D05C57E-06E5-413A-9C09-94DC04DBE935}" type="datetimeFigureOut">
               <a:rPr lang="en-US" smtClean="0"/>
-              <a:t>11/22/2012</a:t>
+              <a:t>12/9/2012</a:t>
             </a:fld>
             <a:endParaRPr lang="en-US"/>
           </a:p>
@@ -1342,7 +1342,7 @@
           <a:p>
             <a:fld id="{2D05C57E-06E5-413A-9C09-94DC04DBE935}" type="datetimeFigureOut">
               <a:rPr lang="en-US" smtClean="0"/>
-              <a:t>11/22/2012</a:t>
+              <a:t>12/9/2012</a:t>
             </a:fld>
             <a:endParaRPr lang="en-US"/>
           </a:p>
@@ -1764,7 +1764,7 @@
           <a:p>
             <a:fld id="{2D05C57E-06E5-413A-9C09-94DC04DBE935}" type="datetimeFigureOut">
               <a:rPr lang="en-US" smtClean="0"/>
-              <a:t>11/22/2012</a:t>
+              <a:t>12/9/2012</a:t>
             </a:fld>
             <a:endParaRPr lang="en-US"/>
           </a:p>
@@ -1882,7 +1882,7 @@
           <a:p>
             <a:fld id="{2D05C57E-06E5-413A-9C09-94DC04DBE935}" type="datetimeFigureOut">
               <a:rPr lang="en-US" smtClean="0"/>
-              <a:t>11/22/2012</a:t>
+              <a:t>12/9/2012</a:t>
             </a:fld>
             <a:endParaRPr lang="en-US"/>
           </a:p>
@@ -1977,7 +1977,7 @@
           <a:p>
             <a:fld id="{2D05C57E-06E5-413A-9C09-94DC04DBE935}" type="datetimeFigureOut">
               <a:rPr lang="en-US" smtClean="0"/>
-              <a:t>11/22/2012</a:t>
+              <a:t>12/9/2012</a:t>
             </a:fld>
             <a:endParaRPr lang="en-US"/>
           </a:p>
@@ -2254,7 +2254,7 @@
           <a:p>
             <a:fld id="{2D05C57E-06E5-413A-9C09-94DC04DBE935}" type="datetimeFigureOut">
               <a:rPr lang="en-US" smtClean="0"/>
-              <a:t>11/22/2012</a:t>
+              <a:t>12/9/2012</a:t>
             </a:fld>
             <a:endParaRPr lang="en-US"/>
           </a:p>
@@ -2507,7 +2507,7 @@
           <a:p>
             <a:fld id="{2D05C57E-06E5-413A-9C09-94DC04DBE935}" type="datetimeFigureOut">
               <a:rPr lang="en-US" smtClean="0"/>
-              <a:t>11/22/2012</a:t>
+              <a:t>12/9/2012</a:t>
             </a:fld>
             <a:endParaRPr lang="en-US"/>
           </a:p>
@@ -2720,7 +2720,7 @@
           <a:p>
             <a:fld id="{2D05C57E-06E5-413A-9C09-94DC04DBE935}" type="datetimeFigureOut">
               <a:rPr lang="en-US" smtClean="0"/>
-              <a:t>11/22/2012</a:t>
+              <a:t>12/9/2012</a:t>
             </a:fld>
             <a:endParaRPr lang="en-US"/>
           </a:p>
@@ -3103,7 +3103,7 @@
         </p:nvCxnSpPr>
         <p:spPr>
           <a:xfrm rot="10800000" flipV="1">
-            <a:off x="3657600" y="2438397"/>
+            <a:off x="1709057" y="2225631"/>
             <a:ext cx="849630" cy="2"/>
           </a:xfrm>
           <a:prstGeom prst="curvedConnector3">
@@ -3132,20 +3132,17 @@
           <p:cNvPr id="18" name="Curved Connector 17"/>
           <p:cNvCxnSpPr>
             <a:stCxn id="7" idx="0"/>
-            <a:endCxn id="15" idx="3"/>
+            <a:endCxn id="23" idx="3"/>
           </p:cNvCxnSpPr>
           <p:nvPr/>
         </p:nvCxnSpPr>
         <p:spPr>
-          <a:xfrm rot="5400000" flipH="1" flipV="1">
-            <a:off x="4171950" y="4400550"/>
-            <a:ext cx="304800" cy="342900"/>
-          </a:xfrm>
-          <a:prstGeom prst="curvedConnector4">
-            <a:avLst>
-              <a:gd name="adj1" fmla="val 12500"/>
-              <a:gd name="adj2" fmla="val 166667"/>
-            </a:avLst>
+          <a:xfrm rot="16200000" flipV="1">
+            <a:off x="6877051" y="3714751"/>
+            <a:ext cx="609599" cy="1409700"/>
+          </a:xfrm>
+          <a:prstGeom prst="curvedConnector2">
+            <a:avLst/>
           </a:prstGeom>
         </p:spPr>
         <p:style>
@@ -3167,17 +3164,20 @@
         <p:nvCxnSpPr>
           <p:cNvPr id="78" name="Curved Connector 77"/>
           <p:cNvCxnSpPr>
+            <a:stCxn id="74" idx="0"/>
             <a:endCxn id="75" idx="2"/>
           </p:cNvCxnSpPr>
           <p:nvPr/>
         </p:nvCxnSpPr>
         <p:spPr>
-          <a:xfrm rot="10800000">
-            <a:off x="342900" y="3581400"/>
-            <a:ext cx="571502" cy="76200"/>
-          </a:xfrm>
-          <a:prstGeom prst="curvedConnector2">
-            <a:avLst/>
+          <a:xfrm rot="16200000" flipV="1">
+            <a:off x="3886200" y="3619501"/>
+            <a:ext cx="304801" cy="228600"/>
+          </a:xfrm>
+          <a:prstGeom prst="curvedConnector3">
+            <a:avLst>
+              <a:gd name="adj1" fmla="val 50000"/>
+            </a:avLst>
           </a:prstGeom>
         </p:spPr>
         <p:style>
@@ -3205,7 +3205,7 @@
         </p:nvCxnSpPr>
         <p:spPr>
           <a:xfrm rot="10800000" flipV="1">
-            <a:off x="3657600" y="1371599"/>
+            <a:off x="1709057" y="1158833"/>
             <a:ext cx="849630" cy="2"/>
           </a:xfrm>
           <a:prstGeom prst="curvedConnector3">
@@ -3229,41 +3229,6 @@
           </a:fontRef>
         </p:style>
       </p:cxnSp>
-      <p:cxnSp>
-        <p:nvCxnSpPr>
-          <p:cNvPr id="33" name="Curved Connector 32"/>
-          <p:cNvCxnSpPr/>
-          <p:nvPr/>
-        </p:nvCxnSpPr>
-        <p:spPr>
-          <a:xfrm rot="10800000">
-            <a:off x="7543800" y="1917702"/>
-            <a:ext cx="304800" cy="1"/>
-          </a:xfrm>
-          <a:prstGeom prst="curvedConnector3">
-            <a:avLst>
-              <a:gd name="adj1" fmla="val 50000"/>
-            </a:avLst>
-          </a:prstGeom>
-          <a:ln>
-            <a:prstDash val="sysDot"/>
-          </a:ln>
-        </p:spPr>
-        <p:style>
-          <a:lnRef idx="3">
-            <a:schemeClr val="accent2"/>
-          </a:lnRef>
-          <a:fillRef idx="0">
-            <a:schemeClr val="accent2"/>
-          </a:fillRef>
-          <a:effectRef idx="2">
-            <a:schemeClr val="accent2"/>
-          </a:effectRef>
-          <a:fontRef idx="minor">
-            <a:schemeClr val="tx1"/>
-          </a:fontRef>
-        </p:style>
-      </p:cxnSp>
       <p:sp>
         <p:nvSpPr>
           <p:cNvPr id="4" name="Rectangle 3"/>
@@ -3272,7 +3237,7 @@
         </p:nvSpPr>
         <p:spPr>
           <a:xfrm>
-            <a:off x="1524000" y="4724400"/>
+            <a:off x="5257800" y="4724400"/>
             <a:ext cx="685800" cy="457199"/>
           </a:xfrm>
           <a:prstGeom prst="rect">
@@ -3316,7 +3281,7 @@
         </p:nvSpPr>
         <p:spPr>
           <a:xfrm>
-            <a:off x="2286000" y="4724400"/>
+            <a:off x="6019800" y="4724400"/>
             <a:ext cx="685800" cy="457199"/>
           </a:xfrm>
           <a:prstGeom prst="rect">
@@ -3359,7 +3324,7 @@
         </p:nvSpPr>
         <p:spPr>
           <a:xfrm>
-            <a:off x="3048000" y="4724400"/>
+            <a:off x="6781800" y="4724400"/>
             <a:ext cx="685800" cy="457199"/>
           </a:xfrm>
           <a:prstGeom prst="rect">
@@ -3403,7 +3368,7 @@
         </p:nvSpPr>
         <p:spPr>
           <a:xfrm>
-            <a:off x="3810000" y="4724400"/>
+            <a:off x="7543800" y="4724400"/>
             <a:ext cx="685800" cy="457199"/>
           </a:xfrm>
           <a:prstGeom prst="rect">
@@ -3447,7 +3412,7 @@
         </p:nvSpPr>
         <p:spPr>
           <a:xfrm>
-            <a:off x="4572000" y="4724400"/>
+            <a:off x="8305800" y="4724400"/>
             <a:ext cx="685800" cy="457199"/>
           </a:xfrm>
           <a:prstGeom prst="rect">
@@ -3485,13 +3450,13 @@
       </p:sp>
       <p:sp>
         <p:nvSpPr>
-          <p:cNvPr id="9" name="Rectangle 8"/>
+          <p:cNvPr id="23" name="Rectangle 22"/>
           <p:cNvSpPr/>
           <p:nvPr/>
         </p:nvSpPr>
         <p:spPr>
           <a:xfrm>
-            <a:off x="5334000" y="4724400"/>
+            <a:off x="5791200" y="3886201"/>
             <a:ext cx="685800" cy="457199"/>
           </a:xfrm>
           <a:prstGeom prst="rect">
@@ -3521,21 +3486,54 @@
             <a:pPr algn="ctr"/>
             <a:r>
               <a:rPr lang="en-US" sz="1200" dirty="0" smtClean="0"/>
-              <a:t>45-Blue condo</a:t>
+              <a:t>5-Sally lawn</a:t>
             </a:r>
             <a:endParaRPr lang="en-US" sz="1200" dirty="0"/>
           </a:p>
         </p:txBody>
       </p:sp>
-      <p:sp>
-        <p:nvSpPr>
-          <p:cNvPr id="10" name="Rectangle 9"/>
+      <p:cxnSp>
+        <p:nvCxnSpPr>
+          <p:cNvPr id="29" name="Curved Connector 28"/>
+          <p:cNvCxnSpPr>
+            <a:stCxn id="23" idx="2"/>
+            <a:endCxn id="4" idx="0"/>
+          </p:cNvCxnSpPr>
+          <p:nvPr/>
+        </p:nvCxnSpPr>
+        <p:spPr>
+          <a:xfrm rot="5400000">
+            <a:off x="5676900" y="4267200"/>
+            <a:ext cx="381000" cy="533400"/>
+          </a:xfrm>
+          <a:prstGeom prst="curvedConnector3">
+            <a:avLst/>
+          </a:prstGeom>
+        </p:spPr>
+        <p:style>
+          <a:lnRef idx="3">
+            <a:schemeClr val="accent2"/>
+          </a:lnRef>
+          <a:fillRef idx="0">
+            <a:schemeClr val="accent2"/>
+          </a:fillRef>
+          <a:effectRef idx="2">
+            <a:schemeClr val="accent2"/>
+          </a:effectRef>
+          <a:fontRef idx="minor">
+            <a:schemeClr val="tx1"/>
+          </a:fontRef>
+        </p:style>
+      </p:cxnSp>
+      <p:sp>
+        <p:nvSpPr>
+          <p:cNvPr id="30" name="Rectangle 29"/>
           <p:cNvSpPr/>
           <p:nvPr/>
         </p:nvSpPr>
         <p:spPr>
           <a:xfrm>
-            <a:off x="6096000" y="4724400"/>
+            <a:off x="4495800" y="4724400"/>
             <a:ext cx="685800" cy="457199"/>
           </a:xfrm>
           <a:prstGeom prst="rect">
@@ -3565,7 +3563,7 @@
             <a:pPr algn="ctr"/>
             <a:r>
               <a:rPr lang="en-US" sz="1200" dirty="0" smtClean="0"/>
-              <a:t>46-condo</a:t>
+              <a:t>7-Darcy Cabin</a:t>
             </a:r>
             <a:endParaRPr lang="en-US" sz="1200" dirty="0"/>
           </a:p>
@@ -3573,13 +3571,13 @@
       </p:sp>
       <p:sp>
         <p:nvSpPr>
-          <p:cNvPr id="11" name="Rectangle 10"/>
+          <p:cNvPr id="34" name="Rectangle 33"/>
           <p:cNvSpPr/>
           <p:nvPr/>
         </p:nvSpPr>
         <p:spPr>
           <a:xfrm>
-            <a:off x="6858000" y="4724400"/>
+            <a:off x="3733800" y="4724400"/>
             <a:ext cx="685800" cy="457199"/>
           </a:xfrm>
           <a:prstGeom prst="rect">
@@ -3609,7 +3607,7 @@
             <a:pPr algn="ctr"/>
             <a:r>
               <a:rPr lang="en-US" sz="1200" dirty="0" smtClean="0"/>
-              <a:t>47-condo</a:t>
+              <a:t>8-Josh Cabin</a:t>
             </a:r>
             <a:endParaRPr lang="en-US" sz="1200" dirty="0"/>
           </a:p>
@@ -3617,13 +3615,13 @@
       </p:sp>
       <p:sp>
         <p:nvSpPr>
-          <p:cNvPr id="12" name="Rectangle 11"/>
+          <p:cNvPr id="35" name="Rectangle 34"/>
           <p:cNvSpPr/>
           <p:nvPr/>
         </p:nvSpPr>
         <p:spPr>
           <a:xfrm>
-            <a:off x="7620000" y="4724400"/>
+            <a:off x="2971800" y="4724401"/>
             <a:ext cx="685800" cy="457199"/>
           </a:xfrm>
           <a:prstGeom prst="rect">
@@ -3653,7 +3651,7 @@
             <a:pPr algn="ctr"/>
             <a:r>
               <a:rPr lang="en-US" sz="1200" dirty="0" smtClean="0"/>
-              <a:t>48-Red condo</a:t>
+              <a:t>9-Sarah Cabin</a:t>
             </a:r>
             <a:endParaRPr lang="en-US" sz="1200" dirty="0"/>
           </a:p>
@@ -3661,13 +3659,13 @@
       </p:sp>
       <p:sp>
         <p:nvSpPr>
-          <p:cNvPr id="13" name="Rectangle 12"/>
+          <p:cNvPr id="36" name="Rectangle 35"/>
           <p:cNvSpPr/>
           <p:nvPr/>
         </p:nvSpPr>
         <p:spPr>
           <a:xfrm>
-            <a:off x="8382000" y="4724401"/>
+            <a:off x="3309257" y="1463634"/>
             <a:ext cx="685800" cy="457199"/>
           </a:xfrm>
           <a:prstGeom prst="rect">
@@ -3697,7 +3695,7 @@
             <a:pPr algn="ctr"/>
             <a:r>
               <a:rPr lang="en-US" sz="1200" dirty="0" smtClean="0"/>
-              <a:t>50-condo</a:t>
+              <a:t>10-Farr Cabin</a:t>
             </a:r>
             <a:endParaRPr lang="en-US" sz="1200" dirty="0"/>
           </a:p>
@@ -3705,14 +3703,14 @@
       </p:sp>
       <p:sp>
         <p:nvSpPr>
-          <p:cNvPr id="14" name="Rectangle 13"/>
+          <p:cNvPr id="37" name="Rectangle 36"/>
           <p:cNvSpPr/>
           <p:nvPr/>
         </p:nvSpPr>
         <p:spPr>
           <a:xfrm>
-            <a:off x="8382000" y="5257801"/>
-            <a:ext cx="685800" cy="457199"/>
+            <a:off x="2547257" y="854034"/>
+            <a:ext cx="685800" cy="1066800"/>
           </a:xfrm>
           <a:prstGeom prst="rect">
             <a:avLst/>
@@ -3741,7 +3739,7 @@
             <a:pPr algn="ctr"/>
             <a:r>
               <a:rPr lang="en-US" sz="1200" dirty="0" smtClean="0"/>
-              <a:t>52-beach</a:t>
+              <a:t>11-Gma Drive</a:t>
             </a:r>
             <a:endParaRPr lang="en-US" sz="1200" dirty="0"/>
           </a:p>
@@ -3749,13 +3747,13 @@
       </p:sp>
       <p:sp>
         <p:nvSpPr>
-          <p:cNvPr id="15" name="Rectangle 14"/>
+          <p:cNvPr id="38" name="Rectangle 37"/>
           <p:cNvSpPr/>
           <p:nvPr/>
         </p:nvSpPr>
         <p:spPr>
           <a:xfrm>
-            <a:off x="3810000" y="4191000"/>
+            <a:off x="1785257" y="1463634"/>
             <a:ext cx="685800" cy="457199"/>
           </a:xfrm>
           <a:prstGeom prst="rect">
@@ -3785,7 +3783,7 @@
             <a:pPr algn="ctr"/>
             <a:r>
               <a:rPr lang="en-US" sz="1200" dirty="0" smtClean="0"/>
-              <a:t>42-Haig cabin</a:t>
+              <a:t>13-Gma Lawn</a:t>
             </a:r>
             <a:endParaRPr lang="en-US" sz="1200" dirty="0"/>
           </a:p>
@@ -3793,13 +3791,13 @@
       </p:sp>
       <p:sp>
         <p:nvSpPr>
-          <p:cNvPr id="16" name="Rectangle 15"/>
+          <p:cNvPr id="39" name="Rectangle 38"/>
           <p:cNvSpPr/>
           <p:nvPr/>
         </p:nvSpPr>
         <p:spPr>
           <a:xfrm>
-            <a:off x="3821430" y="3657601"/>
+            <a:off x="1023257" y="1463634"/>
             <a:ext cx="685800" cy="457199"/>
           </a:xfrm>
           <a:prstGeom prst="rect">
@@ -3828,22 +3826,22 @@
           <a:p>
             <a:pPr algn="ctr"/>
             <a:r>
-              <a:rPr lang="en-US" sz="1050" dirty="0" smtClean="0"/>
-              <a:t>40-Grass alley</a:t>
-            </a:r>
-            <a:endParaRPr lang="en-US" sz="1050" dirty="0"/>
-          </a:p>
-        </p:txBody>
-      </p:sp>
-      <p:sp>
-        <p:nvSpPr>
-          <p:cNvPr id="21" name="Rectangle 20"/>
+              <a:rPr lang="en-US" sz="1200" dirty="0" smtClean="0"/>
+              <a:t>12-Gma Cabin</a:t>
+            </a:r>
+            <a:endParaRPr lang="en-US" sz="1200" dirty="0"/>
+          </a:p>
+        </p:txBody>
+      </p:sp>
+      <p:sp>
+        <p:nvSpPr>
+          <p:cNvPr id="40" name="Rectangle 39"/>
           <p:cNvSpPr/>
           <p:nvPr/>
         </p:nvSpPr>
         <p:spPr>
           <a:xfrm>
-            <a:off x="4572000" y="3657600"/>
+            <a:off x="261257" y="1463634"/>
             <a:ext cx="685800" cy="457199"/>
           </a:xfrm>
           <a:prstGeom prst="rect">
@@ -3872,21 +3870,22 @@
           <a:p>
             <a:pPr algn="ctr"/>
             <a:r>
-              <a:rPr lang="en-US" sz="1100" dirty="0" smtClean="0"/>
-              <a:t>41-Betsy drying</a:t>
-            </a:r>
-          </a:p>
-        </p:txBody>
-      </p:sp>
-      <p:sp>
-        <p:nvSpPr>
-          <p:cNvPr id="22" name="Rectangle 21"/>
+              <a:rPr lang="en-US" sz="1200" dirty="0" smtClean="0"/>
+              <a:t>15-Gma Wall</a:t>
+            </a:r>
+            <a:endParaRPr lang="en-US" sz="1200" dirty="0"/>
+          </a:p>
+        </p:txBody>
+      </p:sp>
+      <p:sp>
+        <p:nvSpPr>
+          <p:cNvPr id="41" name="Rectangle 40"/>
           <p:cNvSpPr/>
           <p:nvPr/>
         </p:nvSpPr>
         <p:spPr>
           <a:xfrm>
-            <a:off x="3048000" y="3657600"/>
+            <a:off x="1023257" y="930235"/>
             <a:ext cx="685800" cy="457199"/>
           </a:xfrm>
           <a:prstGeom prst="rect">
@@ -3916,7 +3915,7 @@
             <a:pPr algn="ctr"/>
             <a:r>
               <a:rPr lang="en-US" sz="1200" dirty="0" smtClean="0"/>
-              <a:t>39-Haig door</a:t>
+              <a:t>18-Gma Back</a:t>
             </a:r>
             <a:endParaRPr lang="en-US" sz="1200" dirty="0"/>
           </a:p>
@@ -3924,13 +3923,13 @@
       </p:sp>
       <p:sp>
         <p:nvSpPr>
-          <p:cNvPr id="23" name="Rectangle 22"/>
+          <p:cNvPr id="42" name="Rectangle 41"/>
           <p:cNvSpPr/>
           <p:nvPr/>
         </p:nvSpPr>
         <p:spPr>
           <a:xfrm>
-            <a:off x="2286000" y="3657600"/>
+            <a:off x="1023257" y="396834"/>
             <a:ext cx="685800" cy="457199"/>
           </a:xfrm>
           <a:prstGeom prst="rect">
@@ -3960,21 +3959,54 @@
             <a:pPr algn="ctr"/>
             <a:r>
               <a:rPr lang="en-US" sz="1200" dirty="0" smtClean="0"/>
-              <a:t>5-Sally lawn</a:t>
+              <a:t>19-Boat house</a:t>
             </a:r>
             <a:endParaRPr lang="en-US" sz="1200" dirty="0"/>
           </a:p>
         </p:txBody>
       </p:sp>
-      <p:sp>
-        <p:nvSpPr>
-          <p:cNvPr id="24" name="Rectangle 23"/>
+      <p:cxnSp>
+        <p:nvCxnSpPr>
+          <p:cNvPr id="43" name="Curved Connector 42"/>
+          <p:cNvCxnSpPr>
+            <a:stCxn id="41" idx="1"/>
+            <a:endCxn id="40" idx="0"/>
+          </p:cNvCxnSpPr>
+          <p:nvPr/>
+        </p:nvCxnSpPr>
+        <p:spPr>
+          <a:xfrm rot="10800000" flipV="1">
+            <a:off x="604157" y="1158834"/>
+            <a:ext cx="419100" cy="304799"/>
+          </a:xfrm>
+          <a:prstGeom prst="curvedConnector2">
+            <a:avLst/>
+          </a:prstGeom>
+        </p:spPr>
+        <p:style>
+          <a:lnRef idx="3">
+            <a:schemeClr val="accent2"/>
+          </a:lnRef>
+          <a:fillRef idx="0">
+            <a:schemeClr val="accent2"/>
+          </a:fillRef>
+          <a:effectRef idx="2">
+            <a:schemeClr val="accent2"/>
+          </a:effectRef>
+          <a:fontRef idx="minor">
+            <a:schemeClr val="tx1"/>
+          </a:fontRef>
+        </p:style>
+      </p:cxnSp>
+      <p:sp>
+        <p:nvSpPr>
+          <p:cNvPr id="50" name="Rectangle 49"/>
           <p:cNvSpPr/>
           <p:nvPr/>
         </p:nvSpPr>
         <p:spPr>
           <a:xfrm>
-            <a:off x="2286000" y="3124200"/>
+            <a:off x="2590800" y="4038602"/>
             <a:ext cx="685800" cy="457199"/>
           </a:xfrm>
           <a:prstGeom prst="rect">
@@ -4003,637 +4035,10 @@
           <a:p>
             <a:pPr algn="ctr"/>
             <a:r>
-              <a:rPr lang="en-US" sz="1200" dirty="0" smtClean="0"/>
-              <a:t>38-Sally drive</a:t>
-            </a:r>
-            <a:endParaRPr lang="en-US" sz="1200" dirty="0"/>
-          </a:p>
-        </p:txBody>
-      </p:sp>
-      <p:cxnSp>
-        <p:nvCxnSpPr>
-          <p:cNvPr id="26" name="Curved Connector 25"/>
-          <p:cNvCxnSpPr>
-            <a:stCxn id="22" idx="0"/>
-            <a:endCxn id="24" idx="3"/>
-          </p:cNvCxnSpPr>
-          <p:nvPr/>
-        </p:nvCxnSpPr>
-        <p:spPr>
-          <a:xfrm rot="16200000" flipV="1">
-            <a:off x="3028950" y="3295650"/>
-            <a:ext cx="304800" cy="419100"/>
-          </a:xfrm>
-          <a:prstGeom prst="curvedConnector2">
-            <a:avLst/>
-          </a:prstGeom>
-        </p:spPr>
-        <p:style>
-          <a:lnRef idx="3">
-            <a:schemeClr val="accent2"/>
-          </a:lnRef>
-          <a:fillRef idx="0">
-            <a:schemeClr val="accent2"/>
-          </a:fillRef>
-          <a:effectRef idx="2">
-            <a:schemeClr val="accent2"/>
-          </a:effectRef>
-          <a:fontRef idx="minor">
-            <a:schemeClr val="tx1"/>
-          </a:fontRef>
-        </p:style>
-      </p:cxnSp>
-      <p:cxnSp>
-        <p:nvCxnSpPr>
-          <p:cNvPr id="29" name="Curved Connector 28"/>
-          <p:cNvCxnSpPr>
-            <a:stCxn id="23" idx="2"/>
-            <a:endCxn id="4" idx="0"/>
-          </p:cNvCxnSpPr>
-          <p:nvPr/>
-        </p:nvCxnSpPr>
-        <p:spPr>
-          <a:xfrm rot="5400000">
-            <a:off x="1943100" y="4038599"/>
-            <a:ext cx="609601" cy="762000"/>
-          </a:xfrm>
-          <a:prstGeom prst="curvedConnector3">
-            <a:avLst/>
-          </a:prstGeom>
-        </p:spPr>
-        <p:style>
-          <a:lnRef idx="3">
-            <a:schemeClr val="accent2"/>
-          </a:lnRef>
-          <a:fillRef idx="0">
-            <a:schemeClr val="accent2"/>
-          </a:fillRef>
-          <a:effectRef idx="2">
-            <a:schemeClr val="accent2"/>
-          </a:effectRef>
-          <a:fontRef idx="minor">
-            <a:schemeClr val="tx1"/>
-          </a:fontRef>
-        </p:style>
-      </p:cxnSp>
-      <p:sp>
-        <p:nvSpPr>
-          <p:cNvPr id="30" name="Rectangle 29"/>
-          <p:cNvSpPr/>
-          <p:nvPr/>
-        </p:nvSpPr>
-        <p:spPr>
-          <a:xfrm>
-            <a:off x="762000" y="4724400"/>
-            <a:ext cx="685800" cy="457199"/>
-          </a:xfrm>
-          <a:prstGeom prst="rect">
-            <a:avLst/>
-          </a:prstGeom>
-        </p:spPr>
-        <p:style>
-          <a:lnRef idx="2">
-            <a:schemeClr val="accent1">
-              <a:shade val="50000"/>
-            </a:schemeClr>
-          </a:lnRef>
-          <a:fillRef idx="1">
-            <a:schemeClr val="accent1"/>
-          </a:fillRef>
-          <a:effectRef idx="0">
-            <a:schemeClr val="accent1"/>
-          </a:effectRef>
-          <a:fontRef idx="minor">
-            <a:schemeClr val="lt1"/>
-          </a:fontRef>
-        </p:style>
-        <p:txBody>
-          <a:bodyPr rtlCol="0" anchor="ctr"/>
-          <a:lstStyle/>
-          <a:p>
-            <a:pPr algn="ctr"/>
-            <a:r>
-              <a:rPr lang="en-US" sz="1200" dirty="0" smtClean="0"/>
-              <a:t>7-Darcy Cabin</a:t>
-            </a:r>
-            <a:endParaRPr lang="en-US" sz="1200" dirty="0"/>
-          </a:p>
-        </p:txBody>
-      </p:sp>
-      <p:sp>
-        <p:nvSpPr>
-          <p:cNvPr id="34" name="Rectangle 33"/>
-          <p:cNvSpPr/>
-          <p:nvPr/>
-        </p:nvSpPr>
-        <p:spPr>
-          <a:xfrm>
-            <a:off x="6781800" y="1676400"/>
-            <a:ext cx="685800" cy="457199"/>
-          </a:xfrm>
-          <a:prstGeom prst="rect">
-            <a:avLst/>
-          </a:prstGeom>
-        </p:spPr>
-        <p:style>
-          <a:lnRef idx="2">
-            <a:schemeClr val="accent1">
-              <a:shade val="50000"/>
-            </a:schemeClr>
-          </a:lnRef>
-          <a:fillRef idx="1">
-            <a:schemeClr val="accent1"/>
-          </a:fillRef>
-          <a:effectRef idx="0">
-            <a:schemeClr val="accent1"/>
-          </a:effectRef>
-          <a:fontRef idx="minor">
-            <a:schemeClr val="lt1"/>
-          </a:fontRef>
-        </p:style>
-        <p:txBody>
-          <a:bodyPr rtlCol="0" anchor="ctr"/>
-          <a:lstStyle/>
-          <a:p>
-            <a:pPr algn="ctr"/>
-            <a:r>
-              <a:rPr lang="en-US" sz="1200" dirty="0" smtClean="0"/>
-              <a:t>8-Josh Cabin</a:t>
-            </a:r>
-            <a:endParaRPr lang="en-US" sz="1200" dirty="0"/>
-          </a:p>
-        </p:txBody>
-      </p:sp>
-      <p:sp>
-        <p:nvSpPr>
-          <p:cNvPr id="35" name="Rectangle 34"/>
-          <p:cNvSpPr/>
-          <p:nvPr/>
-        </p:nvSpPr>
-        <p:spPr>
-          <a:xfrm>
-            <a:off x="6019800" y="1676400"/>
-            <a:ext cx="685800" cy="457199"/>
-          </a:xfrm>
-          <a:prstGeom prst="rect">
-            <a:avLst/>
-          </a:prstGeom>
-        </p:spPr>
-        <p:style>
-          <a:lnRef idx="2">
-            <a:schemeClr val="accent1">
-              <a:shade val="50000"/>
-            </a:schemeClr>
-          </a:lnRef>
-          <a:fillRef idx="1">
-            <a:schemeClr val="accent1"/>
-          </a:fillRef>
-          <a:effectRef idx="0">
-            <a:schemeClr val="accent1"/>
-          </a:effectRef>
-          <a:fontRef idx="minor">
-            <a:schemeClr val="lt1"/>
-          </a:fontRef>
-        </p:style>
-        <p:txBody>
-          <a:bodyPr rtlCol="0" anchor="ctr"/>
-          <a:lstStyle/>
-          <a:p>
-            <a:pPr algn="ctr"/>
-            <a:r>
-              <a:rPr lang="en-US" sz="1200" dirty="0" smtClean="0"/>
-              <a:t>9-Sarah Cabin</a:t>
-            </a:r>
-            <a:endParaRPr lang="en-US" sz="1200" dirty="0"/>
-          </a:p>
-        </p:txBody>
-      </p:sp>
-      <p:sp>
-        <p:nvSpPr>
-          <p:cNvPr id="36" name="Rectangle 35"/>
-          <p:cNvSpPr/>
-          <p:nvPr/>
-        </p:nvSpPr>
-        <p:spPr>
-          <a:xfrm>
-            <a:off x="5257800" y="1676400"/>
-            <a:ext cx="685800" cy="457199"/>
-          </a:xfrm>
-          <a:prstGeom prst="rect">
-            <a:avLst/>
-          </a:prstGeom>
-        </p:spPr>
-        <p:style>
-          <a:lnRef idx="2">
-            <a:schemeClr val="accent1">
-              <a:shade val="50000"/>
-            </a:schemeClr>
-          </a:lnRef>
-          <a:fillRef idx="1">
-            <a:schemeClr val="accent1"/>
-          </a:fillRef>
-          <a:effectRef idx="0">
-            <a:schemeClr val="accent1"/>
-          </a:effectRef>
-          <a:fontRef idx="minor">
-            <a:schemeClr val="lt1"/>
-          </a:fontRef>
-        </p:style>
-        <p:txBody>
-          <a:bodyPr rtlCol="0" anchor="ctr"/>
-          <a:lstStyle/>
-          <a:p>
-            <a:pPr algn="ctr"/>
-            <a:r>
-              <a:rPr lang="en-US" sz="1200" dirty="0" smtClean="0"/>
-              <a:t>10-Farr Cabin</a:t>
-            </a:r>
-            <a:endParaRPr lang="en-US" sz="1200" dirty="0"/>
-          </a:p>
-        </p:txBody>
-      </p:sp>
-      <p:sp>
-        <p:nvSpPr>
-          <p:cNvPr id="37" name="Rectangle 36"/>
-          <p:cNvSpPr/>
-          <p:nvPr/>
-        </p:nvSpPr>
-        <p:spPr>
-          <a:xfrm>
-            <a:off x="4495800" y="1066800"/>
-            <a:ext cx="685800" cy="1066800"/>
-          </a:xfrm>
-          <a:prstGeom prst="rect">
-            <a:avLst/>
-          </a:prstGeom>
-        </p:spPr>
-        <p:style>
-          <a:lnRef idx="2">
-            <a:schemeClr val="accent1">
-              <a:shade val="50000"/>
-            </a:schemeClr>
-          </a:lnRef>
-          <a:fillRef idx="1">
-            <a:schemeClr val="accent1"/>
-          </a:fillRef>
-          <a:effectRef idx="0">
-            <a:schemeClr val="accent1"/>
-          </a:effectRef>
-          <a:fontRef idx="minor">
-            <a:schemeClr val="lt1"/>
-          </a:fontRef>
-        </p:style>
-        <p:txBody>
-          <a:bodyPr rtlCol="0" anchor="ctr"/>
-          <a:lstStyle/>
-          <a:p>
-            <a:pPr algn="ctr"/>
-            <a:r>
-              <a:rPr lang="en-US" sz="1200" dirty="0" smtClean="0"/>
-              <a:t>11-Gma Drive</a:t>
-            </a:r>
-            <a:endParaRPr lang="en-US" sz="1200" dirty="0"/>
-          </a:p>
-        </p:txBody>
-      </p:sp>
-      <p:sp>
-        <p:nvSpPr>
-          <p:cNvPr id="38" name="Rectangle 37"/>
-          <p:cNvSpPr/>
-          <p:nvPr/>
-        </p:nvSpPr>
-        <p:spPr>
-          <a:xfrm>
-            <a:off x="3733800" y="1676400"/>
-            <a:ext cx="685800" cy="457199"/>
-          </a:xfrm>
-          <a:prstGeom prst="rect">
-            <a:avLst/>
-          </a:prstGeom>
-        </p:spPr>
-        <p:style>
-          <a:lnRef idx="2">
-            <a:schemeClr val="accent1">
-              <a:shade val="50000"/>
-            </a:schemeClr>
-          </a:lnRef>
-          <a:fillRef idx="1">
-            <a:schemeClr val="accent1"/>
-          </a:fillRef>
-          <a:effectRef idx="0">
-            <a:schemeClr val="accent1"/>
-          </a:effectRef>
-          <a:fontRef idx="minor">
-            <a:schemeClr val="lt1"/>
-          </a:fontRef>
-        </p:style>
-        <p:txBody>
-          <a:bodyPr rtlCol="0" anchor="ctr"/>
-          <a:lstStyle/>
-          <a:p>
-            <a:pPr algn="ctr"/>
-            <a:r>
-              <a:rPr lang="en-US" sz="1200" dirty="0" smtClean="0"/>
-              <a:t>13-Gma Lawn</a:t>
-            </a:r>
-            <a:endParaRPr lang="en-US" sz="1200" dirty="0"/>
-          </a:p>
-        </p:txBody>
-      </p:sp>
-      <p:sp>
-        <p:nvSpPr>
-          <p:cNvPr id="39" name="Rectangle 38"/>
-          <p:cNvSpPr/>
-          <p:nvPr/>
-        </p:nvSpPr>
-        <p:spPr>
-          <a:xfrm>
-            <a:off x="2971800" y="1676400"/>
-            <a:ext cx="685800" cy="457199"/>
-          </a:xfrm>
-          <a:prstGeom prst="rect">
-            <a:avLst/>
-          </a:prstGeom>
-        </p:spPr>
-        <p:style>
-          <a:lnRef idx="2">
-            <a:schemeClr val="accent1">
-              <a:shade val="50000"/>
-            </a:schemeClr>
-          </a:lnRef>
-          <a:fillRef idx="1">
-            <a:schemeClr val="accent1"/>
-          </a:fillRef>
-          <a:effectRef idx="0">
-            <a:schemeClr val="accent1"/>
-          </a:effectRef>
-          <a:fontRef idx="minor">
-            <a:schemeClr val="lt1"/>
-          </a:fontRef>
-        </p:style>
-        <p:txBody>
-          <a:bodyPr rtlCol="0" anchor="ctr"/>
-          <a:lstStyle/>
-          <a:p>
-            <a:pPr algn="ctr"/>
-            <a:r>
-              <a:rPr lang="en-US" sz="1200" dirty="0" smtClean="0"/>
-              <a:t>12-Gma Cabin</a:t>
-            </a:r>
-            <a:endParaRPr lang="en-US" sz="1200" dirty="0"/>
-          </a:p>
-        </p:txBody>
-      </p:sp>
-      <p:sp>
-        <p:nvSpPr>
-          <p:cNvPr id="40" name="Rectangle 39"/>
-          <p:cNvSpPr/>
-          <p:nvPr/>
-        </p:nvSpPr>
-        <p:spPr>
-          <a:xfrm>
-            <a:off x="2209800" y="1676400"/>
-            <a:ext cx="685800" cy="457199"/>
-          </a:xfrm>
-          <a:prstGeom prst="rect">
-            <a:avLst/>
-          </a:prstGeom>
-        </p:spPr>
-        <p:style>
-          <a:lnRef idx="2">
-            <a:schemeClr val="accent1">
-              <a:shade val="50000"/>
-            </a:schemeClr>
-          </a:lnRef>
-          <a:fillRef idx="1">
-            <a:schemeClr val="accent1"/>
-          </a:fillRef>
-          <a:effectRef idx="0">
-            <a:schemeClr val="accent1"/>
-          </a:effectRef>
-          <a:fontRef idx="minor">
-            <a:schemeClr val="lt1"/>
-          </a:fontRef>
-        </p:style>
-        <p:txBody>
-          <a:bodyPr rtlCol="0" anchor="ctr"/>
-          <a:lstStyle/>
-          <a:p>
-            <a:pPr algn="ctr"/>
-            <a:r>
-              <a:rPr lang="en-US" sz="1200" dirty="0" smtClean="0"/>
-              <a:t>15-Gma Wall</a:t>
-            </a:r>
-            <a:endParaRPr lang="en-US" sz="1200" dirty="0"/>
-          </a:p>
-        </p:txBody>
-      </p:sp>
-      <p:sp>
-        <p:nvSpPr>
-          <p:cNvPr id="41" name="Rectangle 40"/>
-          <p:cNvSpPr/>
-          <p:nvPr/>
-        </p:nvSpPr>
-        <p:spPr>
-          <a:xfrm>
-            <a:off x="2971800" y="1143001"/>
-            <a:ext cx="685800" cy="457199"/>
-          </a:xfrm>
-          <a:prstGeom prst="rect">
-            <a:avLst/>
-          </a:prstGeom>
-        </p:spPr>
-        <p:style>
-          <a:lnRef idx="2">
-            <a:schemeClr val="accent1">
-              <a:shade val="50000"/>
-            </a:schemeClr>
-          </a:lnRef>
-          <a:fillRef idx="1">
-            <a:schemeClr val="accent1"/>
-          </a:fillRef>
-          <a:effectRef idx="0">
-            <a:schemeClr val="accent1"/>
-          </a:effectRef>
-          <a:fontRef idx="minor">
-            <a:schemeClr val="lt1"/>
-          </a:fontRef>
-        </p:style>
-        <p:txBody>
-          <a:bodyPr rtlCol="0" anchor="ctr"/>
-          <a:lstStyle/>
-          <a:p>
-            <a:pPr algn="ctr"/>
-            <a:r>
-              <a:rPr lang="en-US" sz="1200" dirty="0" smtClean="0"/>
-              <a:t>18-Gma Back</a:t>
-            </a:r>
-            <a:endParaRPr lang="en-US" sz="1200" dirty="0"/>
-          </a:p>
-        </p:txBody>
-      </p:sp>
-      <p:sp>
-        <p:nvSpPr>
-          <p:cNvPr id="42" name="Rectangle 41"/>
-          <p:cNvSpPr/>
-          <p:nvPr/>
-        </p:nvSpPr>
-        <p:spPr>
-          <a:xfrm>
-            <a:off x="2971800" y="609600"/>
-            <a:ext cx="685800" cy="457199"/>
-          </a:xfrm>
-          <a:prstGeom prst="rect">
-            <a:avLst/>
-          </a:prstGeom>
-        </p:spPr>
-        <p:style>
-          <a:lnRef idx="2">
-            <a:schemeClr val="accent1">
-              <a:shade val="50000"/>
-            </a:schemeClr>
-          </a:lnRef>
-          <a:fillRef idx="1">
-            <a:schemeClr val="accent1"/>
-          </a:fillRef>
-          <a:effectRef idx="0">
-            <a:schemeClr val="accent1"/>
-          </a:effectRef>
-          <a:fontRef idx="minor">
-            <a:schemeClr val="lt1"/>
-          </a:fontRef>
-        </p:style>
-        <p:txBody>
-          <a:bodyPr rtlCol="0" anchor="ctr"/>
-          <a:lstStyle/>
-          <a:p>
-            <a:pPr algn="ctr"/>
-            <a:r>
-              <a:rPr lang="en-US" sz="1200" dirty="0" smtClean="0"/>
-              <a:t>19-Boat house</a:t>
-            </a:r>
-            <a:endParaRPr lang="en-US" sz="1200" dirty="0"/>
-          </a:p>
-        </p:txBody>
-      </p:sp>
-      <p:cxnSp>
-        <p:nvCxnSpPr>
-          <p:cNvPr id="43" name="Curved Connector 42"/>
-          <p:cNvCxnSpPr>
-            <a:stCxn id="41" idx="1"/>
-            <a:endCxn id="40" idx="0"/>
-          </p:cNvCxnSpPr>
-          <p:nvPr/>
-        </p:nvCxnSpPr>
-        <p:spPr>
-          <a:xfrm rot="10800000" flipV="1">
-            <a:off x="2552700" y="1371600"/>
-            <a:ext cx="419100" cy="304799"/>
-          </a:xfrm>
-          <a:prstGeom prst="curvedConnector2">
-            <a:avLst/>
-          </a:prstGeom>
-        </p:spPr>
-        <p:style>
-          <a:lnRef idx="3">
-            <a:schemeClr val="accent2"/>
-          </a:lnRef>
-          <a:fillRef idx="0">
-            <a:schemeClr val="accent2"/>
-          </a:fillRef>
-          <a:effectRef idx="2">
-            <a:schemeClr val="accent2"/>
-          </a:effectRef>
-          <a:fontRef idx="minor">
-            <a:schemeClr val="tx1"/>
-          </a:fontRef>
-        </p:style>
-      </p:cxnSp>
-      <p:sp>
-        <p:nvSpPr>
-          <p:cNvPr id="50" name="Rectangle 49"/>
-          <p:cNvSpPr/>
-          <p:nvPr/>
-        </p:nvSpPr>
-        <p:spPr>
-          <a:xfrm>
-            <a:off x="5638800" y="990601"/>
-            <a:ext cx="685800" cy="457199"/>
-          </a:xfrm>
-          <a:prstGeom prst="rect">
-            <a:avLst/>
-          </a:prstGeom>
-        </p:spPr>
-        <p:style>
-          <a:lnRef idx="2">
-            <a:schemeClr val="accent1">
-              <a:shade val="50000"/>
-            </a:schemeClr>
-          </a:lnRef>
-          <a:fillRef idx="1">
-            <a:schemeClr val="accent1"/>
-          </a:fillRef>
-          <a:effectRef idx="0">
-            <a:schemeClr val="accent1"/>
-          </a:effectRef>
-          <a:fontRef idx="minor">
-            <a:schemeClr val="lt1"/>
-          </a:fontRef>
-        </p:style>
-        <p:txBody>
-          <a:bodyPr rtlCol="0" anchor="ctr"/>
-          <a:lstStyle/>
-          <a:p>
-            <a:pPr algn="ctr"/>
-            <a:r>
               <a:rPr lang="en-US" sz="1050" dirty="0" smtClean="0"/>
               <a:t>22-Stone table</a:t>
             </a:r>
             <a:endParaRPr lang="en-US" sz="1050" dirty="0"/>
-          </a:p>
-        </p:txBody>
-      </p:sp>
-      <p:sp>
-        <p:nvSpPr>
-          <p:cNvPr id="51" name="Rectangle 50"/>
-          <p:cNvSpPr/>
-          <p:nvPr/>
-        </p:nvSpPr>
-        <p:spPr>
-          <a:xfrm>
-            <a:off x="6781800" y="1143001"/>
-            <a:ext cx="685800" cy="457199"/>
-          </a:xfrm>
-          <a:prstGeom prst="rect">
-            <a:avLst/>
-          </a:prstGeom>
-        </p:spPr>
-        <p:style>
-          <a:lnRef idx="2">
-            <a:schemeClr val="accent1">
-              <a:shade val="50000"/>
-            </a:schemeClr>
-          </a:lnRef>
-          <a:fillRef idx="1">
-            <a:schemeClr val="accent1"/>
-          </a:fillRef>
-          <a:effectRef idx="0">
-            <a:schemeClr val="accent1"/>
-          </a:effectRef>
-          <a:fontRef idx="minor">
-            <a:schemeClr val="lt1"/>
-          </a:fontRef>
-        </p:style>
-        <p:txBody>
-          <a:bodyPr rtlCol="0" anchor="ctr"/>
-          <a:lstStyle/>
-          <a:p>
-            <a:pPr algn="ctr"/>
-            <a:r>
-              <a:rPr lang="en-US" sz="1200" dirty="0" smtClean="0"/>
-              <a:t>23-Lich lawn</a:t>
-            </a:r>
-            <a:endParaRPr lang="en-US" sz="1200" dirty="0"/>
           </a:p>
         </p:txBody>
       </p:sp>
@@ -4647,7 +4052,7 @@
         </p:nvCxnSpPr>
         <p:spPr>
           <a:xfrm rot="16200000" flipH="1">
-            <a:off x="5934076" y="1495424"/>
+            <a:off x="2886076" y="4543425"/>
             <a:ext cx="228598" cy="133350"/>
           </a:xfrm>
           <a:prstGeom prst="curvedConnector3">
@@ -4675,15 +4080,318 @@
         <p:nvCxnSpPr>
           <p:cNvPr id="58" name="Curved Connector 57"/>
           <p:cNvCxnSpPr>
-            <a:stCxn id="51" idx="1"/>
+            <a:stCxn id="74" idx="2"/>
             <a:endCxn id="35" idx="0"/>
           </p:cNvCxnSpPr>
           <p:nvPr/>
         </p:nvCxnSpPr>
         <p:spPr>
-          <a:xfrm rot="10800000" flipV="1">
-            <a:off x="6362700" y="1371600"/>
-            <a:ext cx="419100" cy="304799"/>
+          <a:xfrm rot="5400000">
+            <a:off x="3543300" y="4114800"/>
+            <a:ext cx="381001" cy="838200"/>
+          </a:xfrm>
+          <a:prstGeom prst="curvedConnector3">
+            <a:avLst>
+              <a:gd name="adj1" fmla="val 50000"/>
+            </a:avLst>
+          </a:prstGeom>
+        </p:spPr>
+        <p:style>
+          <a:lnRef idx="3">
+            <a:schemeClr val="accent2"/>
+          </a:lnRef>
+          <a:fillRef idx="0">
+            <a:schemeClr val="accent2"/>
+          </a:fillRef>
+          <a:effectRef idx="2">
+            <a:schemeClr val="accent2"/>
+          </a:effectRef>
+          <a:fontRef idx="minor">
+            <a:schemeClr val="tx1"/>
+          </a:fontRef>
+        </p:style>
+      </p:cxnSp>
+      <p:sp>
+        <p:nvSpPr>
+          <p:cNvPr id="75" name="Rectangle 74"/>
+          <p:cNvSpPr/>
+          <p:nvPr/>
+        </p:nvSpPr>
+        <p:spPr>
+          <a:xfrm>
+            <a:off x="3581400" y="3124201"/>
+            <a:ext cx="685800" cy="457199"/>
+          </a:xfrm>
+          <a:prstGeom prst="rect">
+            <a:avLst/>
+          </a:prstGeom>
+        </p:spPr>
+        <p:style>
+          <a:lnRef idx="2">
+            <a:schemeClr val="accent1">
+              <a:shade val="50000"/>
+            </a:schemeClr>
+          </a:lnRef>
+          <a:fillRef idx="1">
+            <a:schemeClr val="accent1"/>
+          </a:fillRef>
+          <a:effectRef idx="0">
+            <a:schemeClr val="accent1"/>
+          </a:effectRef>
+          <a:fontRef idx="minor">
+            <a:schemeClr val="lt1"/>
+          </a:fontRef>
+        </p:style>
+        <p:txBody>
+          <a:bodyPr rtlCol="0" anchor="ctr"/>
+          <a:lstStyle/>
+          <a:p>
+            <a:pPr algn="ctr"/>
+            <a:r>
+              <a:rPr lang="en-US" sz="1200" dirty="0" smtClean="0"/>
+              <a:t>26-Tree house</a:t>
+            </a:r>
+            <a:endParaRPr lang="en-US" sz="1200" dirty="0"/>
+          </a:p>
+        </p:txBody>
+      </p:sp>
+      <p:sp>
+        <p:nvSpPr>
+          <p:cNvPr id="76" name="Rectangle 75"/>
+          <p:cNvSpPr/>
+          <p:nvPr/>
+        </p:nvSpPr>
+        <p:spPr>
+          <a:xfrm>
+            <a:off x="4343400" y="3124200"/>
+            <a:ext cx="685800" cy="457199"/>
+          </a:xfrm>
+          <a:prstGeom prst="rect">
+            <a:avLst/>
+          </a:prstGeom>
+        </p:spPr>
+        <p:style>
+          <a:lnRef idx="2">
+            <a:schemeClr val="accent1">
+              <a:shade val="50000"/>
+            </a:schemeClr>
+          </a:lnRef>
+          <a:fillRef idx="1">
+            <a:schemeClr val="accent1"/>
+          </a:fillRef>
+          <a:effectRef idx="0">
+            <a:schemeClr val="accent1"/>
+          </a:effectRef>
+          <a:fontRef idx="minor">
+            <a:schemeClr val="lt1"/>
+          </a:fontRef>
+        </p:style>
+        <p:txBody>
+          <a:bodyPr rtlCol="0" anchor="ctr"/>
+          <a:lstStyle/>
+          <a:p>
+            <a:pPr algn="ctr"/>
+            <a:r>
+              <a:rPr lang="en-US" sz="1050" dirty="0" smtClean="0"/>
+              <a:t>28-Darcy drive</a:t>
+            </a:r>
+            <a:endParaRPr lang="en-US" sz="1050" dirty="0"/>
+          </a:p>
+        </p:txBody>
+      </p:sp>
+      <p:sp>
+        <p:nvSpPr>
+          <p:cNvPr id="83" name="Rectangle 82"/>
+          <p:cNvSpPr/>
+          <p:nvPr/>
+        </p:nvSpPr>
+        <p:spPr>
+          <a:xfrm>
+            <a:off x="5257800" y="5257801"/>
+            <a:ext cx="685800" cy="457199"/>
+          </a:xfrm>
+          <a:prstGeom prst="rect">
+            <a:avLst/>
+          </a:prstGeom>
+        </p:spPr>
+        <p:style>
+          <a:lnRef idx="2">
+            <a:schemeClr val="accent1">
+              <a:shade val="50000"/>
+            </a:schemeClr>
+          </a:lnRef>
+          <a:fillRef idx="1">
+            <a:schemeClr val="accent1"/>
+          </a:fillRef>
+          <a:effectRef idx="0">
+            <a:schemeClr val="accent1"/>
+          </a:effectRef>
+          <a:fontRef idx="minor">
+            <a:schemeClr val="lt1"/>
+          </a:fontRef>
+        </p:style>
+        <p:txBody>
+          <a:bodyPr rtlCol="0" anchor="ctr"/>
+          <a:lstStyle/>
+          <a:p>
+            <a:pPr algn="ctr"/>
+            <a:r>
+              <a:rPr lang="en-US" sz="1200" dirty="0" smtClean="0"/>
+              <a:t>6-beach</a:t>
+            </a:r>
+            <a:endParaRPr lang="en-US" sz="1200" dirty="0"/>
+          </a:p>
+        </p:txBody>
+      </p:sp>
+      <p:sp>
+        <p:nvSpPr>
+          <p:cNvPr id="84" name="Rectangle 83"/>
+          <p:cNvSpPr/>
+          <p:nvPr/>
+        </p:nvSpPr>
+        <p:spPr>
+          <a:xfrm>
+            <a:off x="2547257" y="1997035"/>
+            <a:ext cx="685800" cy="457199"/>
+          </a:xfrm>
+          <a:prstGeom prst="rect">
+            <a:avLst/>
+          </a:prstGeom>
+        </p:spPr>
+        <p:style>
+          <a:lnRef idx="2">
+            <a:schemeClr val="accent1">
+              <a:shade val="50000"/>
+            </a:schemeClr>
+          </a:lnRef>
+          <a:fillRef idx="1">
+            <a:schemeClr val="accent1"/>
+          </a:fillRef>
+          <a:effectRef idx="0">
+            <a:schemeClr val="accent1"/>
+          </a:effectRef>
+          <a:fontRef idx="minor">
+            <a:schemeClr val="lt1"/>
+          </a:fontRef>
+        </p:style>
+        <p:txBody>
+          <a:bodyPr rtlCol="0" anchor="ctr"/>
+          <a:lstStyle/>
+          <a:p>
+            <a:pPr algn="ctr"/>
+            <a:r>
+              <a:rPr lang="en-US" sz="1200" dirty="0" smtClean="0"/>
+              <a:t>14-Gma ramp</a:t>
+            </a:r>
+            <a:endParaRPr lang="en-US" sz="1200" dirty="0"/>
+          </a:p>
+        </p:txBody>
+      </p:sp>
+      <p:sp>
+        <p:nvSpPr>
+          <p:cNvPr id="85" name="Rectangle 84"/>
+          <p:cNvSpPr/>
+          <p:nvPr/>
+        </p:nvSpPr>
+        <p:spPr>
+          <a:xfrm>
+            <a:off x="1023257" y="1997034"/>
+            <a:ext cx="685800" cy="457199"/>
+          </a:xfrm>
+          <a:prstGeom prst="rect">
+            <a:avLst/>
+          </a:prstGeom>
+        </p:spPr>
+        <p:style>
+          <a:lnRef idx="2">
+            <a:schemeClr val="accent1">
+              <a:shade val="50000"/>
+            </a:schemeClr>
+          </a:lnRef>
+          <a:fillRef idx="1">
+            <a:schemeClr val="accent1"/>
+          </a:fillRef>
+          <a:effectRef idx="0">
+            <a:schemeClr val="accent1"/>
+          </a:effectRef>
+          <a:fontRef idx="minor">
+            <a:schemeClr val="lt1"/>
+          </a:fontRef>
+        </p:style>
+        <p:txBody>
+          <a:bodyPr rtlCol="0" anchor="ctr"/>
+          <a:lstStyle/>
+          <a:p>
+            <a:pPr algn="ctr"/>
+            <a:r>
+              <a:rPr lang="en-US" sz="1200" dirty="0" smtClean="0"/>
+              <a:t>16-Gma beach</a:t>
+            </a:r>
+            <a:endParaRPr lang="en-US" sz="1200" dirty="0"/>
+          </a:p>
+        </p:txBody>
+      </p:sp>
+      <p:sp>
+        <p:nvSpPr>
+          <p:cNvPr id="53" name="Rectangle 52"/>
+          <p:cNvSpPr/>
+          <p:nvPr/>
+        </p:nvSpPr>
+        <p:spPr>
+          <a:xfrm>
+            <a:off x="5105400" y="3124200"/>
+            <a:ext cx="685800" cy="457199"/>
+          </a:xfrm>
+          <a:prstGeom prst="rect">
+            <a:avLst/>
+          </a:prstGeom>
+        </p:spPr>
+        <p:style>
+          <a:lnRef idx="2">
+            <a:schemeClr val="accent1">
+              <a:shade val="50000"/>
+            </a:schemeClr>
+          </a:lnRef>
+          <a:fillRef idx="1">
+            <a:schemeClr val="accent1"/>
+          </a:fillRef>
+          <a:effectRef idx="0">
+            <a:schemeClr val="accent1"/>
+          </a:effectRef>
+          <a:fontRef idx="minor">
+            <a:schemeClr val="lt1"/>
+          </a:fontRef>
+        </p:style>
+        <p:txBody>
+          <a:bodyPr rtlCol="0" anchor="ctr"/>
+          <a:lstStyle/>
+          <a:p>
+            <a:pPr algn="ctr"/>
+            <a:r>
+              <a:rPr lang="en-US" sz="1050" dirty="0" smtClean="0"/>
+              <a:t>30</a:t>
+            </a:r>
+            <a:r>
+              <a:rPr lang="en-US" sz="1050" dirty="0" smtClean="0"/>
+              <a:t>-Hand prints</a:t>
+            </a:r>
+            <a:endParaRPr lang="en-US" sz="1050" dirty="0"/>
+          </a:p>
+        </p:txBody>
+      </p:sp>
+      <p:cxnSp>
+        <p:nvCxnSpPr>
+          <p:cNvPr id="55" name="Curved Connector 54"/>
+          <p:cNvCxnSpPr>
+            <a:stCxn id="23" idx="0"/>
+            <a:endCxn id="53" idx="3"/>
+          </p:cNvCxnSpPr>
+          <p:nvPr/>
+        </p:nvCxnSpPr>
+        <p:spPr>
+          <a:xfrm rot="16200000" flipV="1">
+            <a:off x="5695950" y="3448051"/>
+            <a:ext cx="533401" cy="342900"/>
           </a:xfrm>
           <a:prstGeom prst="curvedConnector2">
             <a:avLst/>
@@ -4706,22 +4414,27 @@
       </p:cxnSp>
       <p:cxnSp>
         <p:nvCxnSpPr>
-          <p:cNvPr id="68" name="Curved Connector 67"/>
-          <p:cNvCxnSpPr/>
+          <p:cNvPr id="59" name="Curved Connector 58"/>
+          <p:cNvCxnSpPr>
+            <a:stCxn id="36" idx="3"/>
+            <a:endCxn id="35" idx="1"/>
+          </p:cNvCxnSpPr>
           <p:nvPr/>
         </p:nvCxnSpPr>
         <p:spPr>
-          <a:xfrm rot="10800000">
-            <a:off x="7543800" y="1384302"/>
-            <a:ext cx="304800" cy="1"/>
-          </a:xfrm>
-          <a:prstGeom prst="curvedConnector3">
+          <a:xfrm flipH="1">
+            <a:off x="2971800" y="1692234"/>
+            <a:ext cx="1023257" cy="3260767"/>
+          </a:xfrm>
+          <a:prstGeom prst="curvedConnector5">
             <a:avLst>
-              <a:gd name="adj1" fmla="val 50000"/>
+              <a:gd name="adj1" fmla="val -66441"/>
+              <a:gd name="adj2" fmla="val 38710"/>
+              <a:gd name="adj3" fmla="val 196615"/>
             </a:avLst>
           </a:prstGeom>
           <a:ln>
-            <a:prstDash val="sysDot"/>
+            <a:prstDash val="sysDash"/>
           </a:ln>
         </p:spPr>
         <p:style>
@@ -4741,23 +4454,23 @@
       </p:cxnSp>
       <p:cxnSp>
         <p:nvCxnSpPr>
-          <p:cNvPr id="71" name="Curved Connector 70"/>
-          <p:cNvCxnSpPr/>
+          <p:cNvPr id="67" name="Curved Connector 66"/>
+          <p:cNvCxnSpPr>
+            <a:stCxn id="74" idx="0"/>
+            <a:endCxn id="76" idx="2"/>
+          </p:cNvCxnSpPr>
           <p:nvPr/>
         </p:nvCxnSpPr>
         <p:spPr>
-          <a:xfrm rot="10800000">
-            <a:off x="304800" y="4942841"/>
-            <a:ext cx="304800" cy="1"/>
+          <a:xfrm rot="5400000" flipH="1" flipV="1">
+            <a:off x="4267199" y="3467100"/>
+            <a:ext cx="304802" cy="533400"/>
           </a:xfrm>
           <a:prstGeom prst="curvedConnector3">
             <a:avLst>
               <a:gd name="adj1" fmla="val 50000"/>
             </a:avLst>
           </a:prstGeom>
-          <a:ln>
-            <a:prstDash val="sysDot"/>
-          </a:ln>
         </p:spPr>
         <p:style>
           <a:lnRef idx="3">
@@ -4774,50 +4487,15 @@
           </a:fontRef>
         </p:style>
       </p:cxnSp>
-      <p:cxnSp>
-        <p:nvCxnSpPr>
-          <p:cNvPr id="72" name="Curved Connector 71"/>
-          <p:cNvCxnSpPr/>
-          <p:nvPr/>
-        </p:nvCxnSpPr>
-        <p:spPr>
-          <a:xfrm rot="10800000">
-            <a:off x="304800" y="4409441"/>
-            <a:ext cx="304800" cy="1"/>
-          </a:xfrm>
-          <a:prstGeom prst="curvedConnector3">
-            <a:avLst>
-              <a:gd name="adj1" fmla="val 50000"/>
-            </a:avLst>
-          </a:prstGeom>
-          <a:ln>
-            <a:prstDash val="sysDot"/>
-          </a:ln>
-        </p:spPr>
-        <p:style>
-          <a:lnRef idx="3">
-            <a:schemeClr val="accent2"/>
-          </a:lnRef>
-          <a:fillRef idx="0">
-            <a:schemeClr val="accent2"/>
-          </a:fillRef>
-          <a:effectRef idx="2">
-            <a:schemeClr val="accent2"/>
-          </a:effectRef>
-          <a:fontRef idx="minor">
-            <a:schemeClr val="tx1"/>
-          </a:fontRef>
-        </p:style>
-      </p:cxnSp>
-      <p:sp>
-        <p:nvSpPr>
-          <p:cNvPr id="73" name="Rectangle 72"/>
+      <p:sp>
+        <p:nvSpPr>
+          <p:cNvPr id="74" name="Rectangle 73"/>
           <p:cNvSpPr/>
           <p:nvPr/>
         </p:nvSpPr>
         <p:spPr>
           <a:xfrm>
-            <a:off x="762000" y="4191000"/>
+            <a:off x="3810000" y="3886201"/>
             <a:ext cx="685800" cy="457199"/>
           </a:xfrm>
           <a:prstGeom prst="rect">
@@ -4846,369 +4524,10 @@
           <a:p>
             <a:pPr algn="ctr"/>
             <a:r>
-              <a:rPr lang="en-US" sz="1050" dirty="0" smtClean="0"/>
-              <a:t>25-Darcy back</a:t>
-            </a:r>
-            <a:endParaRPr lang="en-US" sz="1050" dirty="0"/>
-          </a:p>
-        </p:txBody>
-      </p:sp>
-      <p:sp>
-        <p:nvSpPr>
-          <p:cNvPr id="74" name="Rectangle 73"/>
-          <p:cNvSpPr/>
-          <p:nvPr/>
-        </p:nvSpPr>
-        <p:spPr>
-          <a:xfrm>
-            <a:off x="762000" y="3657600"/>
-            <a:ext cx="685800" cy="457199"/>
-          </a:xfrm>
-          <a:prstGeom prst="rect">
-            <a:avLst/>
-          </a:prstGeom>
-        </p:spPr>
-        <p:style>
-          <a:lnRef idx="2">
-            <a:schemeClr val="accent1">
-              <a:shade val="50000"/>
-            </a:schemeClr>
-          </a:lnRef>
-          <a:fillRef idx="1">
-            <a:schemeClr val="accent1"/>
-          </a:fillRef>
-          <a:effectRef idx="0">
-            <a:schemeClr val="accent1"/>
-          </a:effectRef>
-          <a:fontRef idx="minor">
-            <a:schemeClr val="lt1"/>
-          </a:fontRef>
-        </p:style>
-        <p:txBody>
-          <a:bodyPr rtlCol="0" anchor="ctr"/>
-          <a:lstStyle/>
-          <a:p>
-            <a:pPr algn="ctr"/>
-            <a:r>
               <a:rPr lang="en-US" sz="1000" dirty="0" smtClean="0"/>
               <a:t>24-Haunt house</a:t>
             </a:r>
             <a:endParaRPr lang="en-US" sz="1000" dirty="0"/>
-          </a:p>
-        </p:txBody>
-      </p:sp>
-      <p:sp>
-        <p:nvSpPr>
-          <p:cNvPr id="75" name="Rectangle 74"/>
-          <p:cNvSpPr/>
-          <p:nvPr/>
-        </p:nvSpPr>
-        <p:spPr>
-          <a:xfrm>
-            <a:off x="0" y="3124201"/>
-            <a:ext cx="685800" cy="457199"/>
-          </a:xfrm>
-          <a:prstGeom prst="rect">
-            <a:avLst/>
-          </a:prstGeom>
-        </p:spPr>
-        <p:style>
-          <a:lnRef idx="2">
-            <a:schemeClr val="accent1">
-              <a:shade val="50000"/>
-            </a:schemeClr>
-          </a:lnRef>
-          <a:fillRef idx="1">
-            <a:schemeClr val="accent1"/>
-          </a:fillRef>
-          <a:effectRef idx="0">
-            <a:schemeClr val="accent1"/>
-          </a:effectRef>
-          <a:fontRef idx="minor">
-            <a:schemeClr val="lt1"/>
-          </a:fontRef>
-        </p:style>
-        <p:txBody>
-          <a:bodyPr rtlCol="0" anchor="ctr"/>
-          <a:lstStyle/>
-          <a:p>
-            <a:pPr algn="ctr"/>
-            <a:r>
-              <a:rPr lang="en-US" sz="1200" dirty="0" smtClean="0"/>
-              <a:t>26-Tree house</a:t>
-            </a:r>
-            <a:endParaRPr lang="en-US" sz="1200" dirty="0"/>
-          </a:p>
-        </p:txBody>
-      </p:sp>
-      <p:sp>
-        <p:nvSpPr>
-          <p:cNvPr id="76" name="Rectangle 75"/>
-          <p:cNvSpPr/>
-          <p:nvPr/>
-        </p:nvSpPr>
-        <p:spPr>
-          <a:xfrm>
-            <a:off x="762000" y="3124200"/>
-            <a:ext cx="685800" cy="457199"/>
-          </a:xfrm>
-          <a:prstGeom prst="rect">
-            <a:avLst/>
-          </a:prstGeom>
-        </p:spPr>
-        <p:style>
-          <a:lnRef idx="2">
-            <a:schemeClr val="accent1">
-              <a:shade val="50000"/>
-            </a:schemeClr>
-          </a:lnRef>
-          <a:fillRef idx="1">
-            <a:schemeClr val="accent1"/>
-          </a:fillRef>
-          <a:effectRef idx="0">
-            <a:schemeClr val="accent1"/>
-          </a:effectRef>
-          <a:fontRef idx="minor">
-            <a:schemeClr val="lt1"/>
-          </a:fontRef>
-        </p:style>
-        <p:txBody>
-          <a:bodyPr rtlCol="0" anchor="ctr"/>
-          <a:lstStyle/>
-          <a:p>
-            <a:pPr algn="ctr"/>
-            <a:r>
-              <a:rPr lang="en-US" sz="1050" dirty="0" smtClean="0"/>
-              <a:t>28-Darcy drive</a:t>
-            </a:r>
-            <a:endParaRPr lang="en-US" sz="1050" dirty="0"/>
-          </a:p>
-        </p:txBody>
-      </p:sp>
-      <p:sp>
-        <p:nvSpPr>
-          <p:cNvPr id="81" name="Cloud 80"/>
-          <p:cNvSpPr/>
-          <p:nvPr/>
-        </p:nvSpPr>
-        <p:spPr>
-          <a:xfrm>
-            <a:off x="1489710" y="2514600"/>
-            <a:ext cx="762000" cy="2057400"/>
-          </a:xfrm>
-          <a:prstGeom prst="cloud">
-            <a:avLst/>
-          </a:prstGeom>
-        </p:spPr>
-        <p:style>
-          <a:lnRef idx="2">
-            <a:schemeClr val="accent2">
-              <a:shade val="50000"/>
-            </a:schemeClr>
-          </a:lnRef>
-          <a:fillRef idx="1">
-            <a:schemeClr val="accent2"/>
-          </a:fillRef>
-          <a:effectRef idx="0">
-            <a:schemeClr val="accent2"/>
-          </a:effectRef>
-          <a:fontRef idx="minor">
-            <a:schemeClr val="lt1"/>
-          </a:fontRef>
-        </p:style>
-        <p:txBody>
-          <a:bodyPr rtlCol="0" anchor="ctr"/>
-          <a:lstStyle/>
-          <a:p>
-            <a:pPr algn="ctr"/>
-            <a:r>
-              <a:rPr lang="en-US" sz="1050" dirty="0" smtClean="0"/>
-              <a:t>Drive </a:t>
-            </a:r>
-          </a:p>
-          <a:p>
-            <a:pPr algn="ctr"/>
-            <a:r>
-              <a:rPr lang="en-US" sz="1050" dirty="0" smtClean="0"/>
-              <a:t>Handprints pole  bath</a:t>
-            </a:r>
-            <a:endParaRPr lang="en-US" sz="1050" dirty="0"/>
-          </a:p>
-        </p:txBody>
-      </p:sp>
-      <p:sp>
-        <p:nvSpPr>
-          <p:cNvPr id="82" name="Cloud 81"/>
-          <p:cNvSpPr/>
-          <p:nvPr/>
-        </p:nvSpPr>
-        <p:spPr>
-          <a:xfrm>
-            <a:off x="7239000" y="3124199"/>
-            <a:ext cx="1333500" cy="1485899"/>
-          </a:xfrm>
-          <a:prstGeom prst="cloud">
-            <a:avLst/>
-          </a:prstGeom>
-        </p:spPr>
-        <p:style>
-          <a:lnRef idx="2">
-            <a:schemeClr val="accent2">
-              <a:shade val="50000"/>
-            </a:schemeClr>
-          </a:lnRef>
-          <a:fillRef idx="1">
-            <a:schemeClr val="accent2"/>
-          </a:fillRef>
-          <a:effectRef idx="0">
-            <a:schemeClr val="accent2"/>
-          </a:effectRef>
-          <a:fontRef idx="minor">
-            <a:schemeClr val="lt1"/>
-          </a:fontRef>
-        </p:style>
-        <p:txBody>
-          <a:bodyPr rtlCol="0" anchor="ctr"/>
-          <a:lstStyle/>
-          <a:p>
-            <a:pPr algn="ctr"/>
-            <a:r>
-              <a:rPr lang="en-US" sz="1050" dirty="0" smtClean="0"/>
-              <a:t>Condo stairs red condo interior</a:t>
-            </a:r>
-            <a:endParaRPr lang="en-US" sz="1050" dirty="0"/>
-          </a:p>
-        </p:txBody>
-      </p:sp>
-      <p:sp>
-        <p:nvSpPr>
-          <p:cNvPr id="83" name="Rectangle 82"/>
-          <p:cNvSpPr/>
-          <p:nvPr/>
-        </p:nvSpPr>
-        <p:spPr>
-          <a:xfrm>
-            <a:off x="1524000" y="5257801"/>
-            <a:ext cx="685800" cy="457199"/>
-          </a:xfrm>
-          <a:prstGeom prst="rect">
-            <a:avLst/>
-          </a:prstGeom>
-        </p:spPr>
-        <p:style>
-          <a:lnRef idx="2">
-            <a:schemeClr val="accent1">
-              <a:shade val="50000"/>
-            </a:schemeClr>
-          </a:lnRef>
-          <a:fillRef idx="1">
-            <a:schemeClr val="accent1"/>
-          </a:fillRef>
-          <a:effectRef idx="0">
-            <a:schemeClr val="accent1"/>
-          </a:effectRef>
-          <a:fontRef idx="minor">
-            <a:schemeClr val="lt1"/>
-          </a:fontRef>
-        </p:style>
-        <p:txBody>
-          <a:bodyPr rtlCol="0" anchor="ctr"/>
-          <a:lstStyle/>
-          <a:p>
-            <a:pPr algn="ctr"/>
-            <a:r>
-              <a:rPr lang="en-US" sz="1200" dirty="0" smtClean="0"/>
-              <a:t>6-beach</a:t>
-            </a:r>
-            <a:endParaRPr lang="en-US" sz="1200" dirty="0"/>
-          </a:p>
-        </p:txBody>
-      </p:sp>
-      <p:sp>
-        <p:nvSpPr>
-          <p:cNvPr id="84" name="Rectangle 83"/>
-          <p:cNvSpPr/>
-          <p:nvPr/>
-        </p:nvSpPr>
-        <p:spPr>
-          <a:xfrm>
-            <a:off x="4495800" y="2209801"/>
-            <a:ext cx="685800" cy="457199"/>
-          </a:xfrm>
-          <a:prstGeom prst="rect">
-            <a:avLst/>
-          </a:prstGeom>
-        </p:spPr>
-        <p:style>
-          <a:lnRef idx="2">
-            <a:schemeClr val="accent1">
-              <a:shade val="50000"/>
-            </a:schemeClr>
-          </a:lnRef>
-          <a:fillRef idx="1">
-            <a:schemeClr val="accent1"/>
-          </a:fillRef>
-          <a:effectRef idx="0">
-            <a:schemeClr val="accent1"/>
-          </a:effectRef>
-          <a:fontRef idx="minor">
-            <a:schemeClr val="lt1"/>
-          </a:fontRef>
-        </p:style>
-        <p:txBody>
-          <a:bodyPr rtlCol="0" anchor="ctr"/>
-          <a:lstStyle/>
-          <a:p>
-            <a:pPr algn="ctr"/>
-            <a:r>
-              <a:rPr lang="en-US" sz="1200" dirty="0" smtClean="0"/>
-              <a:t>14-Gma ramp</a:t>
-            </a:r>
-            <a:endParaRPr lang="en-US" sz="1200" dirty="0"/>
-          </a:p>
-        </p:txBody>
-      </p:sp>
-      <p:sp>
-        <p:nvSpPr>
-          <p:cNvPr id="85" name="Rectangle 84"/>
-          <p:cNvSpPr/>
-          <p:nvPr/>
-        </p:nvSpPr>
-        <p:spPr>
-          <a:xfrm>
-            <a:off x="2971800" y="2209800"/>
-            <a:ext cx="685800" cy="457199"/>
-          </a:xfrm>
-          <a:prstGeom prst="rect">
-            <a:avLst/>
-          </a:prstGeom>
-        </p:spPr>
-        <p:style>
-          <a:lnRef idx="2">
-            <a:schemeClr val="accent1">
-              <a:shade val="50000"/>
-            </a:schemeClr>
-          </a:lnRef>
-          <a:fillRef idx="1">
-            <a:schemeClr val="accent1"/>
-          </a:fillRef>
-          <a:effectRef idx="0">
-            <a:schemeClr val="accent1"/>
-          </a:effectRef>
-          <a:fontRef idx="minor">
-            <a:schemeClr val="lt1"/>
-          </a:fontRef>
-        </p:style>
-        <p:txBody>
-          <a:bodyPr rtlCol="0" anchor="ctr"/>
-          <a:lstStyle/>
-          <a:p>
-            <a:pPr algn="ctr"/>
-            <a:r>
-              <a:rPr lang="en-US" sz="1200" dirty="0" smtClean="0"/>
-              <a:t>16-Gma beach</a:t>
-            </a:r>
-            <a:endParaRPr lang="en-US" sz="1200" dirty="0"/>
           </a:p>
         </p:txBody>
       </p:sp>

</xml_diff>

<commit_message>
small fix to map + character descriptions
added messages for look/touch/speak with shauna and guido
</commit_message>
<xml_diff>
--- a/map.pptx
+++ b/map.pptx
@@ -3138,8 +3138,8 @@
         </p:nvCxnSpPr>
         <p:spPr>
           <a:xfrm rot="16200000" flipV="1">
-            <a:off x="6877051" y="3714751"/>
-            <a:ext cx="609599" cy="1409700"/>
+            <a:off x="7258051" y="4095751"/>
+            <a:ext cx="609599" cy="647700"/>
           </a:xfrm>
           <a:prstGeom prst="curvedConnector2">
             <a:avLst/>
@@ -3171,7 +3171,7 @@
         </p:nvCxnSpPr>
         <p:spPr>
           <a:xfrm rot="16200000" flipV="1">
-            <a:off x="3886200" y="3619501"/>
+            <a:off x="4648200" y="3619501"/>
             <a:ext cx="304801" cy="228600"/>
           </a:xfrm>
           <a:prstGeom prst="curvedConnector3">
@@ -3237,7 +3237,7 @@
         </p:nvSpPr>
         <p:spPr>
           <a:xfrm>
-            <a:off x="5257800" y="4724400"/>
+            <a:off x="6019800" y="4724400"/>
             <a:ext cx="685800" cy="457199"/>
           </a:xfrm>
           <a:prstGeom prst="rect">
@@ -3275,13 +3275,13 @@
       </p:sp>
       <p:sp>
         <p:nvSpPr>
-          <p:cNvPr id="5" name="Rectangle 4"/>
+          <p:cNvPr id="6" name="Rectangle 5"/>
           <p:cNvSpPr/>
           <p:nvPr/>
         </p:nvSpPr>
         <p:spPr>
           <a:xfrm>
-            <a:off x="6019800" y="4724400"/>
+            <a:off x="6781800" y="4724400"/>
             <a:ext cx="685800" cy="457199"/>
           </a:xfrm>
           <a:prstGeom prst="rect">
@@ -3311,20 +3311,21 @@
             <a:pPr algn="ctr"/>
             <a:r>
               <a:rPr lang="en-US" sz="1200" dirty="0" smtClean="0"/>
-              <a:t>3-hedge</a:t>
-            </a:r>
-          </a:p>
-        </p:txBody>
-      </p:sp>
-      <p:sp>
-        <p:nvSpPr>
-          <p:cNvPr id="6" name="Rectangle 5"/>
+              <a:t>2-pier</a:t>
+            </a:r>
+            <a:endParaRPr lang="en-US" sz="1200" dirty="0"/>
+          </a:p>
+        </p:txBody>
+      </p:sp>
+      <p:sp>
+        <p:nvSpPr>
+          <p:cNvPr id="7" name="Rectangle 6"/>
           <p:cNvSpPr/>
           <p:nvPr/>
         </p:nvSpPr>
         <p:spPr>
           <a:xfrm>
-            <a:off x="6781800" y="4724400"/>
+            <a:off x="7543800" y="4724400"/>
             <a:ext cx="685800" cy="457199"/>
           </a:xfrm>
           <a:prstGeom prst="rect">
@@ -3354,7 +3355,7 @@
             <a:pPr algn="ctr"/>
             <a:r>
               <a:rPr lang="en-US" sz="1200" dirty="0" smtClean="0"/>
-              <a:t>2-pier</a:t>
+              <a:t>1-Betsy cabin</a:t>
             </a:r>
             <a:endParaRPr lang="en-US" sz="1200" dirty="0"/>
           </a:p>
@@ -3362,13 +3363,13 @@
       </p:sp>
       <p:sp>
         <p:nvSpPr>
-          <p:cNvPr id="7" name="Rectangle 6"/>
+          <p:cNvPr id="8" name="Rectangle 7"/>
           <p:cNvSpPr/>
           <p:nvPr/>
         </p:nvSpPr>
         <p:spPr>
           <a:xfrm>
-            <a:off x="7543800" y="4724400"/>
+            <a:off x="8305800" y="4724400"/>
             <a:ext cx="685800" cy="457199"/>
           </a:xfrm>
           <a:prstGeom prst="rect">
@@ -3397,22 +3398,22 @@
           <a:p>
             <a:pPr algn="ctr"/>
             <a:r>
-              <a:rPr lang="en-US" sz="1200" dirty="0" smtClean="0"/>
-              <a:t>1-Betsy cabin</a:t>
-            </a:r>
-            <a:endParaRPr lang="en-US" sz="1200" dirty="0"/>
-          </a:p>
-        </p:txBody>
-      </p:sp>
-      <p:sp>
-        <p:nvSpPr>
-          <p:cNvPr id="8" name="Rectangle 7"/>
+              <a:rPr lang="en-US" sz="1000" dirty="0" smtClean="0"/>
+              <a:t>44-Budge cabin</a:t>
+            </a:r>
+            <a:endParaRPr lang="en-US" sz="1000" dirty="0"/>
+          </a:p>
+        </p:txBody>
+      </p:sp>
+      <p:sp>
+        <p:nvSpPr>
+          <p:cNvPr id="23" name="Rectangle 22"/>
           <p:cNvSpPr/>
           <p:nvPr/>
         </p:nvSpPr>
         <p:spPr>
           <a:xfrm>
-            <a:off x="8305800" y="4724400"/>
+            <a:off x="6553200" y="3886201"/>
             <a:ext cx="685800" cy="457199"/>
           </a:xfrm>
           <a:prstGeom prst="rect">
@@ -3441,22 +3442,55 @@
           <a:p>
             <a:pPr algn="ctr"/>
             <a:r>
-              <a:rPr lang="en-US" sz="1000" dirty="0" smtClean="0"/>
-              <a:t>44-Budge cabin</a:t>
-            </a:r>
-            <a:endParaRPr lang="en-US" sz="1000" dirty="0"/>
-          </a:p>
-        </p:txBody>
-      </p:sp>
-      <p:sp>
-        <p:nvSpPr>
-          <p:cNvPr id="23" name="Rectangle 22"/>
+              <a:rPr lang="en-US" sz="1200" dirty="0" smtClean="0"/>
+              <a:t>5-Sally lawn</a:t>
+            </a:r>
+            <a:endParaRPr lang="en-US" sz="1200" dirty="0"/>
+          </a:p>
+        </p:txBody>
+      </p:sp>
+      <p:cxnSp>
+        <p:nvCxnSpPr>
+          <p:cNvPr id="29" name="Curved Connector 28"/>
+          <p:cNvCxnSpPr>
+            <a:stCxn id="23" idx="2"/>
+            <a:endCxn id="4" idx="0"/>
+          </p:cNvCxnSpPr>
+          <p:nvPr/>
+        </p:nvCxnSpPr>
+        <p:spPr>
+          <a:xfrm rot="5400000">
+            <a:off x="6438900" y="4267200"/>
+            <a:ext cx="381000" cy="533400"/>
+          </a:xfrm>
+          <a:prstGeom prst="curvedConnector3">
+            <a:avLst/>
+          </a:prstGeom>
+        </p:spPr>
+        <p:style>
+          <a:lnRef idx="3">
+            <a:schemeClr val="accent2"/>
+          </a:lnRef>
+          <a:fillRef idx="0">
+            <a:schemeClr val="accent2"/>
+          </a:fillRef>
+          <a:effectRef idx="2">
+            <a:schemeClr val="accent2"/>
+          </a:effectRef>
+          <a:fontRef idx="minor">
+            <a:schemeClr val="tx1"/>
+          </a:fontRef>
+        </p:style>
+      </p:cxnSp>
+      <p:sp>
+        <p:nvSpPr>
+          <p:cNvPr id="30" name="Rectangle 29"/>
           <p:cNvSpPr/>
           <p:nvPr/>
         </p:nvSpPr>
         <p:spPr>
           <a:xfrm>
-            <a:off x="5791200" y="3886201"/>
+            <a:off x="5257800" y="4724400"/>
             <a:ext cx="685800" cy="457199"/>
           </a:xfrm>
           <a:prstGeom prst="rect">
@@ -3486,48 +3520,15 @@
             <a:pPr algn="ctr"/>
             <a:r>
               <a:rPr lang="en-US" sz="1200" dirty="0" smtClean="0"/>
-              <a:t>5-Sally lawn</a:t>
+              <a:t>7-Darcy Cabin</a:t>
             </a:r>
             <a:endParaRPr lang="en-US" sz="1200" dirty="0"/>
           </a:p>
         </p:txBody>
       </p:sp>
-      <p:cxnSp>
-        <p:nvCxnSpPr>
-          <p:cNvPr id="29" name="Curved Connector 28"/>
-          <p:cNvCxnSpPr>
-            <a:stCxn id="23" idx="2"/>
-            <a:endCxn id="4" idx="0"/>
-          </p:cNvCxnSpPr>
-          <p:nvPr/>
-        </p:nvCxnSpPr>
-        <p:spPr>
-          <a:xfrm rot="5400000">
-            <a:off x="5676900" y="4267200"/>
-            <a:ext cx="381000" cy="533400"/>
-          </a:xfrm>
-          <a:prstGeom prst="curvedConnector3">
-            <a:avLst/>
-          </a:prstGeom>
-        </p:spPr>
-        <p:style>
-          <a:lnRef idx="3">
-            <a:schemeClr val="accent2"/>
-          </a:lnRef>
-          <a:fillRef idx="0">
-            <a:schemeClr val="accent2"/>
-          </a:fillRef>
-          <a:effectRef idx="2">
-            <a:schemeClr val="accent2"/>
-          </a:effectRef>
-          <a:fontRef idx="minor">
-            <a:schemeClr val="tx1"/>
-          </a:fontRef>
-        </p:style>
-      </p:cxnSp>
-      <p:sp>
-        <p:nvSpPr>
-          <p:cNvPr id="30" name="Rectangle 29"/>
+      <p:sp>
+        <p:nvSpPr>
+          <p:cNvPr id="34" name="Rectangle 33"/>
           <p:cNvSpPr/>
           <p:nvPr/>
         </p:nvSpPr>
@@ -3563,7 +3564,7 @@
             <a:pPr algn="ctr"/>
             <a:r>
               <a:rPr lang="en-US" sz="1200" dirty="0" smtClean="0"/>
-              <a:t>7-Darcy Cabin</a:t>
+              <a:t>8-Josh Cabin</a:t>
             </a:r>
             <a:endParaRPr lang="en-US" sz="1200" dirty="0"/>
           </a:p>
@@ -3571,13 +3572,13 @@
       </p:sp>
       <p:sp>
         <p:nvSpPr>
-          <p:cNvPr id="34" name="Rectangle 33"/>
+          <p:cNvPr id="35" name="Rectangle 34"/>
           <p:cNvSpPr/>
           <p:nvPr/>
         </p:nvSpPr>
         <p:spPr>
           <a:xfrm>
-            <a:off x="3733800" y="4724400"/>
+            <a:off x="3733800" y="4724401"/>
             <a:ext cx="685800" cy="457199"/>
           </a:xfrm>
           <a:prstGeom prst="rect">
@@ -3607,7 +3608,7 @@
             <a:pPr algn="ctr"/>
             <a:r>
               <a:rPr lang="en-US" sz="1200" dirty="0" smtClean="0"/>
-              <a:t>8-Josh Cabin</a:t>
+              <a:t>9-Sarah Cabin</a:t>
             </a:r>
             <a:endParaRPr lang="en-US" sz="1200" dirty="0"/>
           </a:p>
@@ -3615,13 +3616,13 @@
       </p:sp>
       <p:sp>
         <p:nvSpPr>
-          <p:cNvPr id="35" name="Rectangle 34"/>
+          <p:cNvPr id="36" name="Rectangle 35"/>
           <p:cNvSpPr/>
           <p:nvPr/>
         </p:nvSpPr>
         <p:spPr>
           <a:xfrm>
-            <a:off x="2971800" y="4724401"/>
+            <a:off x="3309257" y="1463634"/>
             <a:ext cx="685800" cy="457199"/>
           </a:xfrm>
           <a:prstGeom prst="rect">
@@ -3651,7 +3652,7 @@
             <a:pPr algn="ctr"/>
             <a:r>
               <a:rPr lang="en-US" sz="1200" dirty="0" smtClean="0"/>
-              <a:t>9-Sarah Cabin</a:t>
+              <a:t>10-Farr Cabin</a:t>
             </a:r>
             <a:endParaRPr lang="en-US" sz="1200" dirty="0"/>
           </a:p>
@@ -3659,14 +3660,14 @@
       </p:sp>
       <p:sp>
         <p:nvSpPr>
-          <p:cNvPr id="36" name="Rectangle 35"/>
+          <p:cNvPr id="37" name="Rectangle 36"/>
           <p:cNvSpPr/>
           <p:nvPr/>
         </p:nvSpPr>
         <p:spPr>
           <a:xfrm>
-            <a:off x="3309257" y="1463634"/>
-            <a:ext cx="685800" cy="457199"/>
+            <a:off x="2547257" y="854034"/>
+            <a:ext cx="685800" cy="1066800"/>
           </a:xfrm>
           <a:prstGeom prst="rect">
             <a:avLst/>
@@ -3695,7 +3696,7 @@
             <a:pPr algn="ctr"/>
             <a:r>
               <a:rPr lang="en-US" sz="1200" dirty="0" smtClean="0"/>
-              <a:t>10-Farr Cabin</a:t>
+              <a:t>11-Gma Drive</a:t>
             </a:r>
             <a:endParaRPr lang="en-US" sz="1200" dirty="0"/>
           </a:p>
@@ -3703,14 +3704,14 @@
       </p:sp>
       <p:sp>
         <p:nvSpPr>
-          <p:cNvPr id="37" name="Rectangle 36"/>
+          <p:cNvPr id="38" name="Rectangle 37"/>
           <p:cNvSpPr/>
           <p:nvPr/>
         </p:nvSpPr>
         <p:spPr>
           <a:xfrm>
-            <a:off x="2547257" y="854034"/>
-            <a:ext cx="685800" cy="1066800"/>
+            <a:off x="1785257" y="1463634"/>
+            <a:ext cx="685800" cy="457199"/>
           </a:xfrm>
           <a:prstGeom prst="rect">
             <a:avLst/>
@@ -3739,7 +3740,7 @@
             <a:pPr algn="ctr"/>
             <a:r>
               <a:rPr lang="en-US" sz="1200" dirty="0" smtClean="0"/>
-              <a:t>11-Gma Drive</a:t>
+              <a:t>13-Gma Lawn</a:t>
             </a:r>
             <a:endParaRPr lang="en-US" sz="1200" dirty="0"/>
           </a:p>
@@ -3747,13 +3748,13 @@
       </p:sp>
       <p:sp>
         <p:nvSpPr>
-          <p:cNvPr id="38" name="Rectangle 37"/>
+          <p:cNvPr id="39" name="Rectangle 38"/>
           <p:cNvSpPr/>
           <p:nvPr/>
         </p:nvSpPr>
         <p:spPr>
           <a:xfrm>
-            <a:off x="1785257" y="1463634"/>
+            <a:off x="1023257" y="1463634"/>
             <a:ext cx="685800" cy="457199"/>
           </a:xfrm>
           <a:prstGeom prst="rect">
@@ -3783,7 +3784,7 @@
             <a:pPr algn="ctr"/>
             <a:r>
               <a:rPr lang="en-US" sz="1200" dirty="0" smtClean="0"/>
-              <a:t>13-Gma Lawn</a:t>
+              <a:t>12-Gma Cabin</a:t>
             </a:r>
             <a:endParaRPr lang="en-US" sz="1200" dirty="0"/>
           </a:p>
@@ -3791,13 +3792,13 @@
       </p:sp>
       <p:sp>
         <p:nvSpPr>
-          <p:cNvPr id="39" name="Rectangle 38"/>
+          <p:cNvPr id="40" name="Rectangle 39"/>
           <p:cNvSpPr/>
           <p:nvPr/>
         </p:nvSpPr>
         <p:spPr>
           <a:xfrm>
-            <a:off x="1023257" y="1463634"/>
+            <a:off x="261257" y="1463634"/>
             <a:ext cx="685800" cy="457199"/>
           </a:xfrm>
           <a:prstGeom prst="rect">
@@ -3827,7 +3828,7 @@
             <a:pPr algn="ctr"/>
             <a:r>
               <a:rPr lang="en-US" sz="1200" dirty="0" smtClean="0"/>
-              <a:t>12-Gma Cabin</a:t>
+              <a:t>15-Gma Wall</a:t>
             </a:r>
             <a:endParaRPr lang="en-US" sz="1200" dirty="0"/>
           </a:p>
@@ -3835,13 +3836,13 @@
       </p:sp>
       <p:sp>
         <p:nvSpPr>
-          <p:cNvPr id="40" name="Rectangle 39"/>
+          <p:cNvPr id="41" name="Rectangle 40"/>
           <p:cNvSpPr/>
           <p:nvPr/>
         </p:nvSpPr>
         <p:spPr>
           <a:xfrm>
-            <a:off x="261257" y="1463634"/>
+            <a:off x="1023257" y="930235"/>
             <a:ext cx="685800" cy="457199"/>
           </a:xfrm>
           <a:prstGeom prst="rect">
@@ -3871,7 +3872,7 @@
             <a:pPr algn="ctr"/>
             <a:r>
               <a:rPr lang="en-US" sz="1200" dirty="0" smtClean="0"/>
-              <a:t>15-Gma Wall</a:t>
+              <a:t>18-Gma Back</a:t>
             </a:r>
             <a:endParaRPr lang="en-US" sz="1200" dirty="0"/>
           </a:p>
@@ -3879,13 +3880,13 @@
       </p:sp>
       <p:sp>
         <p:nvSpPr>
-          <p:cNvPr id="41" name="Rectangle 40"/>
+          <p:cNvPr id="42" name="Rectangle 41"/>
           <p:cNvSpPr/>
           <p:nvPr/>
         </p:nvSpPr>
         <p:spPr>
           <a:xfrm>
-            <a:off x="1023257" y="930235"/>
+            <a:off x="1023257" y="396834"/>
             <a:ext cx="685800" cy="457199"/>
           </a:xfrm>
           <a:prstGeom prst="rect">
@@ -3915,21 +3916,54 @@
             <a:pPr algn="ctr"/>
             <a:r>
               <a:rPr lang="en-US" sz="1200" dirty="0" smtClean="0"/>
-              <a:t>18-Gma Back</a:t>
+              <a:t>19-Boat house</a:t>
             </a:r>
             <a:endParaRPr lang="en-US" sz="1200" dirty="0"/>
           </a:p>
         </p:txBody>
       </p:sp>
-      <p:sp>
-        <p:nvSpPr>
-          <p:cNvPr id="42" name="Rectangle 41"/>
+      <p:cxnSp>
+        <p:nvCxnSpPr>
+          <p:cNvPr id="43" name="Curved Connector 42"/>
+          <p:cNvCxnSpPr>
+            <a:stCxn id="41" idx="1"/>
+            <a:endCxn id="40" idx="0"/>
+          </p:cNvCxnSpPr>
+          <p:nvPr/>
+        </p:nvCxnSpPr>
+        <p:spPr>
+          <a:xfrm rot="10800000" flipV="1">
+            <a:off x="604157" y="1158834"/>
+            <a:ext cx="419100" cy="304799"/>
+          </a:xfrm>
+          <a:prstGeom prst="curvedConnector2">
+            <a:avLst/>
+          </a:prstGeom>
+        </p:spPr>
+        <p:style>
+          <a:lnRef idx="3">
+            <a:schemeClr val="accent2"/>
+          </a:lnRef>
+          <a:fillRef idx="0">
+            <a:schemeClr val="accent2"/>
+          </a:fillRef>
+          <a:effectRef idx="2">
+            <a:schemeClr val="accent2"/>
+          </a:effectRef>
+          <a:fontRef idx="minor">
+            <a:schemeClr val="tx1"/>
+          </a:fontRef>
+        </p:style>
+      </p:cxnSp>
+      <p:sp>
+        <p:nvSpPr>
+          <p:cNvPr id="50" name="Rectangle 49"/>
           <p:cNvSpPr/>
           <p:nvPr/>
         </p:nvSpPr>
         <p:spPr>
           <a:xfrm>
-            <a:off x="1023257" y="396834"/>
+            <a:off x="3352800" y="4038602"/>
             <a:ext cx="685800" cy="457199"/>
           </a:xfrm>
           <a:prstGeom prst="rect">
@@ -3958,83 +3992,6 @@
           <a:p>
             <a:pPr algn="ctr"/>
             <a:r>
-              <a:rPr lang="en-US" sz="1200" dirty="0" smtClean="0"/>
-              <a:t>19-Boat house</a:t>
-            </a:r>
-            <a:endParaRPr lang="en-US" sz="1200" dirty="0"/>
-          </a:p>
-        </p:txBody>
-      </p:sp>
-      <p:cxnSp>
-        <p:nvCxnSpPr>
-          <p:cNvPr id="43" name="Curved Connector 42"/>
-          <p:cNvCxnSpPr>
-            <a:stCxn id="41" idx="1"/>
-            <a:endCxn id="40" idx="0"/>
-          </p:cNvCxnSpPr>
-          <p:nvPr/>
-        </p:nvCxnSpPr>
-        <p:spPr>
-          <a:xfrm rot="10800000" flipV="1">
-            <a:off x="604157" y="1158834"/>
-            <a:ext cx="419100" cy="304799"/>
-          </a:xfrm>
-          <a:prstGeom prst="curvedConnector2">
-            <a:avLst/>
-          </a:prstGeom>
-        </p:spPr>
-        <p:style>
-          <a:lnRef idx="3">
-            <a:schemeClr val="accent2"/>
-          </a:lnRef>
-          <a:fillRef idx="0">
-            <a:schemeClr val="accent2"/>
-          </a:fillRef>
-          <a:effectRef idx="2">
-            <a:schemeClr val="accent2"/>
-          </a:effectRef>
-          <a:fontRef idx="minor">
-            <a:schemeClr val="tx1"/>
-          </a:fontRef>
-        </p:style>
-      </p:cxnSp>
-      <p:sp>
-        <p:nvSpPr>
-          <p:cNvPr id="50" name="Rectangle 49"/>
-          <p:cNvSpPr/>
-          <p:nvPr/>
-        </p:nvSpPr>
-        <p:spPr>
-          <a:xfrm>
-            <a:off x="2590800" y="4038602"/>
-            <a:ext cx="685800" cy="457199"/>
-          </a:xfrm>
-          <a:prstGeom prst="rect">
-            <a:avLst/>
-          </a:prstGeom>
-        </p:spPr>
-        <p:style>
-          <a:lnRef idx="2">
-            <a:schemeClr val="accent1">
-              <a:shade val="50000"/>
-            </a:schemeClr>
-          </a:lnRef>
-          <a:fillRef idx="1">
-            <a:schemeClr val="accent1"/>
-          </a:fillRef>
-          <a:effectRef idx="0">
-            <a:schemeClr val="accent1"/>
-          </a:effectRef>
-          <a:fontRef idx="minor">
-            <a:schemeClr val="lt1"/>
-          </a:fontRef>
-        </p:style>
-        <p:txBody>
-          <a:bodyPr rtlCol="0" anchor="ctr"/>
-          <a:lstStyle/>
-          <a:p>
-            <a:pPr algn="ctr"/>
-            <a:r>
               <a:rPr lang="en-US" sz="1050" dirty="0" smtClean="0"/>
               <a:t>22-Stone table</a:t>
             </a:r>
@@ -4052,7 +4009,7 @@
         </p:nvCxnSpPr>
         <p:spPr>
           <a:xfrm rot="16200000" flipH="1">
-            <a:off x="2886076" y="4543425"/>
+            <a:off x="3648076" y="4543425"/>
             <a:ext cx="228598" cy="133350"/>
           </a:xfrm>
           <a:prstGeom prst="curvedConnector3">
@@ -4087,7 +4044,7 @@
         </p:nvCxnSpPr>
         <p:spPr>
           <a:xfrm rot="5400000">
-            <a:off x="3543300" y="4114800"/>
+            <a:off x="4305300" y="4114800"/>
             <a:ext cx="381001" cy="838200"/>
           </a:xfrm>
           <a:prstGeom prst="curvedConnector3">
@@ -4119,7 +4076,7 @@
         </p:nvSpPr>
         <p:spPr>
           <a:xfrm>
-            <a:off x="3581400" y="3124201"/>
+            <a:off x="4343400" y="3124201"/>
             <a:ext cx="685800" cy="457199"/>
           </a:xfrm>
           <a:prstGeom prst="rect">
@@ -4163,7 +4120,7 @@
         </p:nvSpPr>
         <p:spPr>
           <a:xfrm>
-            <a:off x="4343400" y="3124200"/>
+            <a:off x="5105400" y="3124200"/>
             <a:ext cx="685800" cy="457199"/>
           </a:xfrm>
           <a:prstGeom prst="rect">
@@ -4207,7 +4164,7 @@
         </p:nvSpPr>
         <p:spPr>
           <a:xfrm>
-            <a:off x="5257800" y="5257801"/>
+            <a:off x="6019800" y="5257801"/>
             <a:ext cx="685800" cy="457199"/>
           </a:xfrm>
           <a:prstGeom prst="rect">
@@ -4339,7 +4296,7 @@
         </p:nvSpPr>
         <p:spPr>
           <a:xfrm>
-            <a:off x="5105400" y="3124200"/>
+            <a:off x="5867400" y="3124200"/>
             <a:ext cx="685800" cy="457199"/>
           </a:xfrm>
           <a:prstGeom prst="rect">
@@ -4369,11 +4326,7 @@
             <a:pPr algn="ctr"/>
             <a:r>
               <a:rPr lang="en-US" sz="1050" dirty="0" smtClean="0"/>
-              <a:t>30</a:t>
-            </a:r>
-            <a:r>
-              <a:rPr lang="en-US" sz="1050" dirty="0" smtClean="0"/>
-              <a:t>-Hand prints</a:t>
+              <a:t>30-Hand prints</a:t>
             </a:r>
             <a:endParaRPr lang="en-US" sz="1050" dirty="0"/>
           </a:p>
@@ -4390,7 +4343,7 @@
         </p:nvCxnSpPr>
         <p:spPr>
           <a:xfrm rot="16200000" flipV="1">
-            <a:off x="5695950" y="3448051"/>
+            <a:off x="6457950" y="3448051"/>
             <a:ext cx="533401" cy="342900"/>
           </a:xfrm>
           <a:prstGeom prst="curvedConnector2">
@@ -4423,14 +4376,14 @@
         </p:nvCxnSpPr>
         <p:spPr>
           <a:xfrm flipH="1">
-            <a:off x="2971800" y="1692234"/>
-            <a:ext cx="1023257" cy="3260767"/>
+            <a:off x="3733800" y="1692234"/>
+            <a:ext cx="261257" cy="3260767"/>
           </a:xfrm>
           <a:prstGeom prst="curvedConnector5">
             <a:avLst>
-              <a:gd name="adj1" fmla="val -66441"/>
-              <a:gd name="adj2" fmla="val 38710"/>
-              <a:gd name="adj3" fmla="val 196615"/>
+              <a:gd name="adj1" fmla="val -223864"/>
+              <a:gd name="adj2" fmla="val 40895"/>
+              <a:gd name="adj3" fmla="val 382955"/>
             </a:avLst>
           </a:prstGeom>
           <a:ln>
@@ -4463,7 +4416,7 @@
         </p:nvCxnSpPr>
         <p:spPr>
           <a:xfrm rot="5400000" flipH="1" flipV="1">
-            <a:off x="4267199" y="3467100"/>
+            <a:off x="5029199" y="3467100"/>
             <a:ext cx="304802" cy="533400"/>
           </a:xfrm>
           <a:prstGeom prst="curvedConnector3">
@@ -4495,7 +4448,7 @@
         </p:nvSpPr>
         <p:spPr>
           <a:xfrm>
-            <a:off x="3810000" y="3886201"/>
+            <a:off x="4572000" y="3886201"/>
             <a:ext cx="685800" cy="457199"/>
           </a:xfrm>
           <a:prstGeom prst="rect">

</xml_diff>